<commit_message>
Novo Commit das apresentações.
</commit_message>
<xml_diff>
--- a/Apresentação_Monografia.pptx
+++ b/Apresentação_Monografia.pptx
@@ -4,10 +4,21 @@
   <p:sldMasterIdLst>
     <p:sldMasterId id="2147483660" r:id="rId1"/>
   </p:sldMasterIdLst>
+  <p:notesMasterIdLst>
+    <p:notesMasterId r:id="rId13"/>
+  </p:notesMasterIdLst>
   <p:sldIdLst>
     <p:sldId id="256" r:id="rId2"/>
     <p:sldId id="257" r:id="rId3"/>
     <p:sldId id="258" r:id="rId4"/>
+    <p:sldId id="259" r:id="rId5"/>
+    <p:sldId id="260" r:id="rId6"/>
+    <p:sldId id="266" r:id="rId7"/>
+    <p:sldId id="265" r:id="rId8"/>
+    <p:sldId id="264" r:id="rId9"/>
+    <p:sldId id="262" r:id="rId10"/>
+    <p:sldId id="261" r:id="rId11"/>
+    <p:sldId id="263" r:id="rId12"/>
   </p:sldIdLst>
   <p:sldSz cx="12192000" cy="6858000"/>
   <p:notesSz cx="6858000" cy="9144000"/>
@@ -114,6 +125,439 @@
 </p:presentation>
 </file>
 
+<file path=ppt/notesMasters/notesMaster1.xml><?xml version="1.0" encoding="utf-8"?>
+<p:notesMaster xmlns:a="http://schemas.openxmlformats.org/drawingml/2006/main" xmlns:r="http://schemas.openxmlformats.org/officeDocument/2006/relationships" xmlns:p="http://schemas.openxmlformats.org/presentationml/2006/main">
+  <p:cSld>
+    <p:bg>
+      <p:bgRef idx="1001">
+        <a:schemeClr val="bg1"/>
+      </p:bgRef>
+    </p:bg>
+    <p:spTree>
+      <p:nvGrpSpPr>
+        <p:cNvPr id="1" name=""/>
+        <p:cNvGrpSpPr/>
+        <p:nvPr/>
+      </p:nvGrpSpPr>
+      <p:grpSpPr>
+        <a:xfrm>
+          <a:off x="0" y="0"/>
+          <a:ext cx="0" cy="0"/>
+          <a:chOff x="0" y="0"/>
+          <a:chExt cx="0" cy="0"/>
+        </a:xfrm>
+      </p:grpSpPr>
+      <p:sp>
+        <p:nvSpPr>
+          <p:cNvPr id="2" name="Espaço Reservado para Cabeçalho 1"/>
+          <p:cNvSpPr>
+            <a:spLocks noGrp="1"/>
+          </p:cNvSpPr>
+          <p:nvPr>
+            <p:ph type="hdr" sz="quarter"/>
+          </p:nvPr>
+        </p:nvSpPr>
+        <p:spPr>
+          <a:xfrm>
+            <a:off x="0" y="0"/>
+            <a:ext cx="2971800" cy="458788"/>
+          </a:xfrm>
+          <a:prstGeom prst="rect">
+            <a:avLst/>
+          </a:prstGeom>
+        </p:spPr>
+        <p:txBody>
+          <a:bodyPr vert="horz" lIns="91440" tIns="45720" rIns="91440" bIns="45720" rtlCol="0"/>
+          <a:lstStyle>
+            <a:lvl1pPr algn="l">
+              <a:defRPr sz="1200"/>
+            </a:lvl1pPr>
+          </a:lstStyle>
+          <a:p>
+            <a:endParaRPr lang="pt-BR"/>
+          </a:p>
+        </p:txBody>
+      </p:sp>
+      <p:sp>
+        <p:nvSpPr>
+          <p:cNvPr id="3" name="Espaço Reservado para Data 2"/>
+          <p:cNvSpPr>
+            <a:spLocks noGrp="1"/>
+          </p:cNvSpPr>
+          <p:nvPr>
+            <p:ph type="dt" idx="1"/>
+          </p:nvPr>
+        </p:nvSpPr>
+        <p:spPr>
+          <a:xfrm>
+            <a:off x="3884613" y="0"/>
+            <a:ext cx="2971800" cy="458788"/>
+          </a:xfrm>
+          <a:prstGeom prst="rect">
+            <a:avLst/>
+          </a:prstGeom>
+        </p:spPr>
+        <p:txBody>
+          <a:bodyPr vert="horz" lIns="91440" tIns="45720" rIns="91440" bIns="45720" rtlCol="0"/>
+          <a:lstStyle>
+            <a:lvl1pPr algn="r">
+              <a:defRPr sz="1200"/>
+            </a:lvl1pPr>
+          </a:lstStyle>
+          <a:p>
+            <a:fld id="{B249BB1A-A7AB-4605-BA31-E8B7C8754CB0}" type="datetimeFigureOut">
+              <a:rPr lang="pt-BR" smtClean="0"/>
+              <a:t>10/03/2022</a:t>
+            </a:fld>
+            <a:endParaRPr lang="pt-BR"/>
+          </a:p>
+        </p:txBody>
+      </p:sp>
+      <p:sp>
+        <p:nvSpPr>
+          <p:cNvPr id="4" name="Espaço Reservado para Imagem de Slide 3"/>
+          <p:cNvSpPr>
+            <a:spLocks noGrp="1" noRot="1" noChangeAspect="1"/>
+          </p:cNvSpPr>
+          <p:nvPr>
+            <p:ph type="sldImg" idx="2"/>
+          </p:nvPr>
+        </p:nvSpPr>
+        <p:spPr>
+          <a:xfrm>
+            <a:off x="685800" y="1143000"/>
+            <a:ext cx="5486400" cy="3086100"/>
+          </a:xfrm>
+          <a:prstGeom prst="rect">
+            <a:avLst/>
+          </a:prstGeom>
+          <a:noFill/>
+          <a:ln w="12700">
+            <a:solidFill>
+              <a:prstClr val="black"/>
+            </a:solidFill>
+          </a:ln>
+        </p:spPr>
+        <p:txBody>
+          <a:bodyPr vert="horz" lIns="91440" tIns="45720" rIns="91440" bIns="45720" rtlCol="0" anchor="ctr"/>
+          <a:lstStyle/>
+          <a:p>
+            <a:endParaRPr lang="pt-BR"/>
+          </a:p>
+        </p:txBody>
+      </p:sp>
+      <p:sp>
+        <p:nvSpPr>
+          <p:cNvPr id="5" name="Espaço Reservado para Anotações 4"/>
+          <p:cNvSpPr>
+            <a:spLocks noGrp="1"/>
+          </p:cNvSpPr>
+          <p:nvPr>
+            <p:ph type="body" sz="quarter" idx="3"/>
+          </p:nvPr>
+        </p:nvSpPr>
+        <p:spPr>
+          <a:xfrm>
+            <a:off x="685800" y="4400550"/>
+            <a:ext cx="5486400" cy="3600450"/>
+          </a:xfrm>
+          <a:prstGeom prst="rect">
+            <a:avLst/>
+          </a:prstGeom>
+        </p:spPr>
+        <p:txBody>
+          <a:bodyPr vert="horz" lIns="91440" tIns="45720" rIns="91440" bIns="45720" rtlCol="0"/>
+          <a:lstStyle/>
+          <a:p>
+            <a:pPr lvl="0"/>
+            <a:r>
+              <a:rPr lang="pt-BR"/>
+              <a:t>Clique para editar os estilos de texto Mestres</a:t>
+            </a:r>
+          </a:p>
+          <a:p>
+            <a:pPr lvl="1"/>
+            <a:r>
+              <a:rPr lang="pt-BR"/>
+              <a:t>Segundo nível</a:t>
+            </a:r>
+          </a:p>
+          <a:p>
+            <a:pPr lvl="2"/>
+            <a:r>
+              <a:rPr lang="pt-BR"/>
+              <a:t>Terceiro nível</a:t>
+            </a:r>
+          </a:p>
+          <a:p>
+            <a:pPr lvl="3"/>
+            <a:r>
+              <a:rPr lang="pt-BR"/>
+              <a:t>Quarto nível</a:t>
+            </a:r>
+          </a:p>
+          <a:p>
+            <a:pPr lvl="4"/>
+            <a:r>
+              <a:rPr lang="pt-BR"/>
+              <a:t>Quinto nível</a:t>
+            </a:r>
+          </a:p>
+        </p:txBody>
+      </p:sp>
+      <p:sp>
+        <p:nvSpPr>
+          <p:cNvPr id="6" name="Espaço Reservado para Rodapé 5"/>
+          <p:cNvSpPr>
+            <a:spLocks noGrp="1"/>
+          </p:cNvSpPr>
+          <p:nvPr>
+            <p:ph type="ftr" sz="quarter" idx="4"/>
+          </p:nvPr>
+        </p:nvSpPr>
+        <p:spPr>
+          <a:xfrm>
+            <a:off x="0" y="8685213"/>
+            <a:ext cx="2971800" cy="458787"/>
+          </a:xfrm>
+          <a:prstGeom prst="rect">
+            <a:avLst/>
+          </a:prstGeom>
+        </p:spPr>
+        <p:txBody>
+          <a:bodyPr vert="horz" lIns="91440" tIns="45720" rIns="91440" bIns="45720" rtlCol="0" anchor="b"/>
+          <a:lstStyle>
+            <a:lvl1pPr algn="l">
+              <a:defRPr sz="1200"/>
+            </a:lvl1pPr>
+          </a:lstStyle>
+          <a:p>
+            <a:endParaRPr lang="pt-BR"/>
+          </a:p>
+        </p:txBody>
+      </p:sp>
+      <p:sp>
+        <p:nvSpPr>
+          <p:cNvPr id="7" name="Espaço Reservado para Número de Slide 6"/>
+          <p:cNvSpPr>
+            <a:spLocks noGrp="1"/>
+          </p:cNvSpPr>
+          <p:nvPr>
+            <p:ph type="sldNum" sz="quarter" idx="5"/>
+          </p:nvPr>
+        </p:nvSpPr>
+        <p:spPr>
+          <a:xfrm>
+            <a:off x="3884613" y="8685213"/>
+            <a:ext cx="2971800" cy="458787"/>
+          </a:xfrm>
+          <a:prstGeom prst="rect">
+            <a:avLst/>
+          </a:prstGeom>
+        </p:spPr>
+        <p:txBody>
+          <a:bodyPr vert="horz" lIns="91440" tIns="45720" rIns="91440" bIns="45720" rtlCol="0" anchor="b"/>
+          <a:lstStyle>
+            <a:lvl1pPr algn="r">
+              <a:defRPr sz="1200"/>
+            </a:lvl1pPr>
+          </a:lstStyle>
+          <a:p>
+            <a:fld id="{5E52DD54-238D-4887-8CA4-0F17E0B9CCB6}" type="slidenum">
+              <a:rPr lang="pt-BR" smtClean="0"/>
+              <a:t>‹nº›</a:t>
+            </a:fld>
+            <a:endParaRPr lang="pt-BR"/>
+          </a:p>
+        </p:txBody>
+      </p:sp>
+    </p:spTree>
+    <p:extLst>
+      <p:ext uri="{BB962C8B-B14F-4D97-AF65-F5344CB8AC3E}">
+        <p14:creationId xmlns:p14="http://schemas.microsoft.com/office/powerpoint/2010/main" val="2437473687"/>
+      </p:ext>
+    </p:extLst>
+  </p:cSld>
+  <p:clrMap bg1="lt1" tx1="dk1" bg2="lt2" tx2="dk2" accent1="accent1" accent2="accent2" accent3="accent3" accent4="accent4" accent5="accent5" accent6="accent6" hlink="hlink" folHlink="folHlink"/>
+  <p:notesStyle>
+    <a:lvl1pPr marL="0" algn="l" defTabSz="914400" rtl="0" eaLnBrk="1" latinLnBrk="0" hangingPunct="1">
+      <a:defRPr sz="1200" kern="1200">
+        <a:solidFill>
+          <a:schemeClr val="tx1"/>
+        </a:solidFill>
+        <a:latin typeface="+mn-lt"/>
+        <a:ea typeface="+mn-ea"/>
+        <a:cs typeface="+mn-cs"/>
+      </a:defRPr>
+    </a:lvl1pPr>
+    <a:lvl2pPr marL="457200" algn="l" defTabSz="914400" rtl="0" eaLnBrk="1" latinLnBrk="0" hangingPunct="1">
+      <a:defRPr sz="1200" kern="1200">
+        <a:solidFill>
+          <a:schemeClr val="tx1"/>
+        </a:solidFill>
+        <a:latin typeface="+mn-lt"/>
+        <a:ea typeface="+mn-ea"/>
+        <a:cs typeface="+mn-cs"/>
+      </a:defRPr>
+    </a:lvl2pPr>
+    <a:lvl3pPr marL="914400" algn="l" defTabSz="914400" rtl="0" eaLnBrk="1" latinLnBrk="0" hangingPunct="1">
+      <a:defRPr sz="1200" kern="1200">
+        <a:solidFill>
+          <a:schemeClr val="tx1"/>
+        </a:solidFill>
+        <a:latin typeface="+mn-lt"/>
+        <a:ea typeface="+mn-ea"/>
+        <a:cs typeface="+mn-cs"/>
+      </a:defRPr>
+    </a:lvl3pPr>
+    <a:lvl4pPr marL="1371600" algn="l" defTabSz="914400" rtl="0" eaLnBrk="1" latinLnBrk="0" hangingPunct="1">
+      <a:defRPr sz="1200" kern="1200">
+        <a:solidFill>
+          <a:schemeClr val="tx1"/>
+        </a:solidFill>
+        <a:latin typeface="+mn-lt"/>
+        <a:ea typeface="+mn-ea"/>
+        <a:cs typeface="+mn-cs"/>
+      </a:defRPr>
+    </a:lvl4pPr>
+    <a:lvl5pPr marL="1828800" algn="l" defTabSz="914400" rtl="0" eaLnBrk="1" latinLnBrk="0" hangingPunct="1">
+      <a:defRPr sz="1200" kern="1200">
+        <a:solidFill>
+          <a:schemeClr val="tx1"/>
+        </a:solidFill>
+        <a:latin typeface="+mn-lt"/>
+        <a:ea typeface="+mn-ea"/>
+        <a:cs typeface="+mn-cs"/>
+      </a:defRPr>
+    </a:lvl5pPr>
+    <a:lvl6pPr marL="2286000" algn="l" defTabSz="914400" rtl="0" eaLnBrk="1" latinLnBrk="0" hangingPunct="1">
+      <a:defRPr sz="1200" kern="1200">
+        <a:solidFill>
+          <a:schemeClr val="tx1"/>
+        </a:solidFill>
+        <a:latin typeface="+mn-lt"/>
+        <a:ea typeface="+mn-ea"/>
+        <a:cs typeface="+mn-cs"/>
+      </a:defRPr>
+    </a:lvl6pPr>
+    <a:lvl7pPr marL="2743200" algn="l" defTabSz="914400" rtl="0" eaLnBrk="1" latinLnBrk="0" hangingPunct="1">
+      <a:defRPr sz="1200" kern="1200">
+        <a:solidFill>
+          <a:schemeClr val="tx1"/>
+        </a:solidFill>
+        <a:latin typeface="+mn-lt"/>
+        <a:ea typeface="+mn-ea"/>
+        <a:cs typeface="+mn-cs"/>
+      </a:defRPr>
+    </a:lvl7pPr>
+    <a:lvl8pPr marL="3200400" algn="l" defTabSz="914400" rtl="0" eaLnBrk="1" latinLnBrk="0" hangingPunct="1">
+      <a:defRPr sz="1200" kern="1200">
+        <a:solidFill>
+          <a:schemeClr val="tx1"/>
+        </a:solidFill>
+        <a:latin typeface="+mn-lt"/>
+        <a:ea typeface="+mn-ea"/>
+        <a:cs typeface="+mn-cs"/>
+      </a:defRPr>
+    </a:lvl8pPr>
+    <a:lvl9pPr marL="3657600" algn="l" defTabSz="914400" rtl="0" eaLnBrk="1" latinLnBrk="0" hangingPunct="1">
+      <a:defRPr sz="1200" kern="1200">
+        <a:solidFill>
+          <a:schemeClr val="tx1"/>
+        </a:solidFill>
+        <a:latin typeface="+mn-lt"/>
+        <a:ea typeface="+mn-ea"/>
+        <a:cs typeface="+mn-cs"/>
+      </a:defRPr>
+    </a:lvl9pPr>
+  </p:notesStyle>
+</p:notesMaster>
+</file>
+
+<file path=ppt/notesSlides/notesSlide1.xml><?xml version="1.0" encoding="utf-8"?>
+<p:notes xmlns:a="http://schemas.openxmlformats.org/drawingml/2006/main" xmlns:r="http://schemas.openxmlformats.org/officeDocument/2006/relationships" xmlns:p="http://schemas.openxmlformats.org/presentationml/2006/main">
+  <p:cSld>
+    <p:spTree>
+      <p:nvGrpSpPr>
+        <p:cNvPr id="1" name=""/>
+        <p:cNvGrpSpPr/>
+        <p:nvPr/>
+      </p:nvGrpSpPr>
+      <p:grpSpPr>
+        <a:xfrm>
+          <a:off x="0" y="0"/>
+          <a:ext cx="0" cy="0"/>
+          <a:chOff x="0" y="0"/>
+          <a:chExt cx="0" cy="0"/>
+        </a:xfrm>
+      </p:grpSpPr>
+      <p:sp>
+        <p:nvSpPr>
+          <p:cNvPr id="2" name="Espaço Reservado para Imagem de Slide 1"/>
+          <p:cNvSpPr>
+            <a:spLocks noGrp="1" noRot="1" noChangeAspect="1"/>
+          </p:cNvSpPr>
+          <p:nvPr>
+            <p:ph type="sldImg"/>
+          </p:nvPr>
+        </p:nvSpPr>
+        <p:spPr/>
+      </p:sp>
+      <p:sp>
+        <p:nvSpPr>
+          <p:cNvPr id="3" name="Espaço Reservado para Anotações 2"/>
+          <p:cNvSpPr>
+            <a:spLocks noGrp="1"/>
+          </p:cNvSpPr>
+          <p:nvPr>
+            <p:ph type="body" idx="1"/>
+          </p:nvPr>
+        </p:nvSpPr>
+        <p:spPr/>
+        <p:txBody>
+          <a:bodyPr/>
+          <a:lstStyle/>
+          <a:p>
+            <a:endParaRPr lang="pt-BR" dirty="0"/>
+          </a:p>
+        </p:txBody>
+      </p:sp>
+      <p:sp>
+        <p:nvSpPr>
+          <p:cNvPr id="4" name="Espaço Reservado para Número de Slide 3"/>
+          <p:cNvSpPr>
+            <a:spLocks noGrp="1"/>
+          </p:cNvSpPr>
+          <p:nvPr>
+            <p:ph type="sldNum" sz="quarter" idx="5"/>
+          </p:nvPr>
+        </p:nvSpPr>
+        <p:spPr/>
+        <p:txBody>
+          <a:bodyPr/>
+          <a:lstStyle/>
+          <a:p>
+            <a:fld id="{5E52DD54-238D-4887-8CA4-0F17E0B9CCB6}" type="slidenum">
+              <a:rPr lang="pt-BR" smtClean="0"/>
+              <a:t>7</a:t>
+            </a:fld>
+            <a:endParaRPr lang="pt-BR"/>
+          </a:p>
+        </p:txBody>
+      </p:sp>
+    </p:spTree>
+    <p:extLst>
+      <p:ext uri="{BB962C8B-B14F-4D97-AF65-F5344CB8AC3E}">
+        <p14:creationId xmlns:p14="http://schemas.microsoft.com/office/powerpoint/2010/main" val="4250786048"/>
+      </p:ext>
+    </p:extLst>
+  </p:cSld>
+  <p:clrMapOvr>
+    <a:masterClrMapping/>
+  </p:clrMapOvr>
+</p:notes>
+</file>
+
 <file path=ppt/slideLayouts/slideLayout1.xml><?xml version="1.0" encoding="utf-8"?>
 <p:sldLayout xmlns:a="http://schemas.openxmlformats.org/drawingml/2006/main" xmlns:r="http://schemas.openxmlformats.org/officeDocument/2006/relationships" xmlns:p="http://schemas.openxmlformats.org/presentationml/2006/main" type="title" preserve="1">
   <p:cSld name="Slide de Título">
@@ -277,7 +721,7 @@
           <a:p>
             <a:fld id="{60BA69AB-7D77-4AD1-B9DF-F84D0C411437}" type="datetimeFigureOut">
               <a:rPr lang="pt-BR" smtClean="0"/>
-              <a:t>07/03/2022</a:t>
+              <a:t>10/03/2022</a:t>
             </a:fld>
             <a:endParaRPr lang="pt-BR"/>
           </a:p>
@@ -447,7 +891,7 @@
           <a:p>
             <a:fld id="{60BA69AB-7D77-4AD1-B9DF-F84D0C411437}" type="datetimeFigureOut">
               <a:rPr lang="pt-BR" smtClean="0"/>
-              <a:t>07/03/2022</a:t>
+              <a:t>10/03/2022</a:t>
             </a:fld>
             <a:endParaRPr lang="pt-BR"/>
           </a:p>
@@ -627,7 +1071,7 @@
           <a:p>
             <a:fld id="{60BA69AB-7D77-4AD1-B9DF-F84D0C411437}" type="datetimeFigureOut">
               <a:rPr lang="pt-BR" smtClean="0"/>
-              <a:t>07/03/2022</a:t>
+              <a:t>10/03/2022</a:t>
             </a:fld>
             <a:endParaRPr lang="pt-BR"/>
           </a:p>
@@ -797,7 +1241,7 @@
           <a:p>
             <a:fld id="{60BA69AB-7D77-4AD1-B9DF-F84D0C411437}" type="datetimeFigureOut">
               <a:rPr lang="pt-BR" smtClean="0"/>
-              <a:t>07/03/2022</a:t>
+              <a:t>10/03/2022</a:t>
             </a:fld>
             <a:endParaRPr lang="pt-BR"/>
           </a:p>
@@ -1065,7 +1509,7 @@
           <a:p>
             <a:fld id="{60BA69AB-7D77-4AD1-B9DF-F84D0C411437}" type="datetimeFigureOut">
               <a:rPr lang="pt-BR" smtClean="0"/>
-              <a:t>07/03/2022</a:t>
+              <a:t>10/03/2022</a:t>
             </a:fld>
             <a:endParaRPr lang="pt-BR"/>
           </a:p>
@@ -1297,7 +1741,7 @@
           <a:p>
             <a:fld id="{60BA69AB-7D77-4AD1-B9DF-F84D0C411437}" type="datetimeFigureOut">
               <a:rPr lang="pt-BR" smtClean="0"/>
-              <a:t>07/03/2022</a:t>
+              <a:t>10/03/2022</a:t>
             </a:fld>
             <a:endParaRPr lang="pt-BR"/>
           </a:p>
@@ -1656,7 +2100,7 @@
           <a:p>
             <a:fld id="{60BA69AB-7D77-4AD1-B9DF-F84D0C411437}" type="datetimeFigureOut">
               <a:rPr lang="pt-BR" smtClean="0"/>
-              <a:t>07/03/2022</a:t>
+              <a:t>10/03/2022</a:t>
             </a:fld>
             <a:endParaRPr lang="pt-BR"/>
           </a:p>
@@ -1797,7 +2241,7 @@
           <a:p>
             <a:fld id="{60BA69AB-7D77-4AD1-B9DF-F84D0C411437}" type="datetimeFigureOut">
               <a:rPr lang="pt-BR" smtClean="0"/>
-              <a:t>07/03/2022</a:t>
+              <a:t>10/03/2022</a:t>
             </a:fld>
             <a:endParaRPr lang="pt-BR"/>
           </a:p>
@@ -1892,7 +2336,7 @@
           <a:p>
             <a:fld id="{60BA69AB-7D77-4AD1-B9DF-F84D0C411437}" type="datetimeFigureOut">
               <a:rPr lang="pt-BR" smtClean="0"/>
-              <a:t>07/03/2022</a:t>
+              <a:t>10/03/2022</a:t>
             </a:fld>
             <a:endParaRPr lang="pt-BR"/>
           </a:p>
@@ -2249,7 +2693,7 @@
           <a:p>
             <a:fld id="{60BA69AB-7D77-4AD1-B9DF-F84D0C411437}" type="datetimeFigureOut">
               <a:rPr lang="pt-BR" smtClean="0"/>
-              <a:t>07/03/2022</a:t>
+              <a:t>10/03/2022</a:t>
             </a:fld>
             <a:endParaRPr lang="pt-BR"/>
           </a:p>
@@ -2606,7 +3050,7 @@
           <a:p>
             <a:fld id="{60BA69AB-7D77-4AD1-B9DF-F84D0C411437}" type="datetimeFigureOut">
               <a:rPr lang="pt-BR" smtClean="0"/>
-              <a:t>07/03/2022</a:t>
+              <a:t>10/03/2022</a:t>
             </a:fld>
             <a:endParaRPr lang="pt-BR"/>
           </a:p>
@@ -2848,7 +3292,7 @@
           <a:p>
             <a:fld id="{60BA69AB-7D77-4AD1-B9DF-F84D0C411437}" type="datetimeFigureOut">
               <a:rPr lang="pt-BR" smtClean="0"/>
-              <a:t>07/03/2022</a:t>
+              <a:t>10/03/2022</a:t>
             </a:fld>
             <a:endParaRPr lang="pt-BR"/>
           </a:p>
@@ -3660,6 +4104,231 @@
 </p:sld>
 </file>
 
+<file path=ppt/slides/slide10.xml><?xml version="1.0" encoding="utf-8"?>
+<p:sld xmlns:a="http://schemas.openxmlformats.org/drawingml/2006/main" xmlns:r="http://schemas.openxmlformats.org/officeDocument/2006/relationships" xmlns:p="http://schemas.openxmlformats.org/presentationml/2006/main">
+  <p:cSld>
+    <p:spTree>
+      <p:nvGrpSpPr>
+        <p:cNvPr id="1" name=""/>
+        <p:cNvGrpSpPr/>
+        <p:nvPr/>
+      </p:nvGrpSpPr>
+      <p:grpSpPr>
+        <a:xfrm>
+          <a:off x="0" y="0"/>
+          <a:ext cx="0" cy="0"/>
+          <a:chOff x="0" y="0"/>
+          <a:chExt cx="0" cy="0"/>
+        </a:xfrm>
+      </p:grpSpPr>
+      <p:sp>
+        <p:nvSpPr>
+          <p:cNvPr id="2" name="Título 1">
+            <a:extLst>
+              <a:ext uri="{FF2B5EF4-FFF2-40B4-BE49-F238E27FC236}">
+                <a16:creationId xmlns:a16="http://schemas.microsoft.com/office/drawing/2014/main" id="{EE723563-498C-41C1-B3F0-3151A8E3C0D1}"/>
+              </a:ext>
+            </a:extLst>
+          </p:cNvPr>
+          <p:cNvSpPr>
+            <a:spLocks noGrp="1"/>
+          </p:cNvSpPr>
+          <p:nvPr>
+            <p:ph type="title"/>
+          </p:nvPr>
+        </p:nvSpPr>
+        <p:spPr/>
+        <p:txBody>
+          <a:bodyPr/>
+          <a:lstStyle/>
+          <a:p>
+            <a:r>
+              <a:rPr lang="pt-BR" dirty="0"/>
+              <a:t>Trabalhos futuros</a:t>
+            </a:r>
+          </a:p>
+        </p:txBody>
+      </p:sp>
+      <p:sp>
+        <p:nvSpPr>
+          <p:cNvPr id="3" name="Espaço Reservado para Conteúdo 2">
+            <a:extLst>
+              <a:ext uri="{FF2B5EF4-FFF2-40B4-BE49-F238E27FC236}">
+                <a16:creationId xmlns:a16="http://schemas.microsoft.com/office/drawing/2014/main" id="{8660081E-8ACB-4B7E-BA17-832681C4C0C9}"/>
+              </a:ext>
+            </a:extLst>
+          </p:cNvPr>
+          <p:cNvSpPr>
+            <a:spLocks noGrp="1"/>
+          </p:cNvSpPr>
+          <p:nvPr>
+            <p:ph idx="1"/>
+          </p:nvPr>
+        </p:nvSpPr>
+        <p:spPr/>
+        <p:txBody>
+          <a:bodyPr>
+            <a:normAutofit fontScale="85000" lnSpcReduction="20000"/>
+          </a:bodyPr>
+          <a:lstStyle/>
+          <a:p>
+            <a:pPr lvl="0">
+              <a:lnSpc>
+                <a:spcPct val="110000"/>
+              </a:lnSpc>
+            </a:pPr>
+            <a:r>
+              <a:rPr lang="pt-BR" dirty="0"/>
+              <a:t>Criar bancos de dados transacional para os anos após 2015 do ENEM e a população desses dados no banco de dados do DW.</a:t>
+            </a:r>
+          </a:p>
+          <a:p>
+            <a:pPr lvl="0">
+              <a:lnSpc>
+                <a:spcPct val="110000"/>
+              </a:lnSpc>
+            </a:pPr>
+            <a:r>
+              <a:rPr lang="pt-BR" dirty="0"/>
+              <a:t>Ampliar a visualização de dados e ampliar os relatórios baseados em novas perguntas que o DW responda.</a:t>
+            </a:r>
+          </a:p>
+          <a:p>
+            <a:pPr lvl="0">
+              <a:lnSpc>
+                <a:spcPct val="110000"/>
+              </a:lnSpc>
+            </a:pPr>
+            <a:r>
+              <a:rPr lang="pt-BR" dirty="0"/>
+              <a:t> Melhorar a capacidade da infraestrutura, principalmente, no armazenamento de dados. </a:t>
+            </a:r>
+          </a:p>
+          <a:p>
+            <a:pPr lvl="0">
+              <a:lnSpc>
+                <a:spcPct val="110000"/>
+              </a:lnSpc>
+            </a:pPr>
+            <a:r>
+              <a:rPr lang="pt-BR" dirty="0"/>
+              <a:t>Refatorar os códigos do ETL tanto do transacional quanto do DW. </a:t>
+            </a:r>
+          </a:p>
+          <a:p>
+            <a:pPr lvl="0">
+              <a:lnSpc>
+                <a:spcPct val="110000"/>
+              </a:lnSpc>
+            </a:pPr>
+            <a:r>
+              <a:rPr lang="pt-BR" dirty="0"/>
+              <a:t>Realizar estudo de heurísticas para melhorar o desempenho das consultas que já existem e geram os relatórios. </a:t>
+            </a:r>
+          </a:p>
+          <a:p>
+            <a:pPr lvl="0">
+              <a:lnSpc>
+                <a:spcPct val="110000"/>
+              </a:lnSpc>
+            </a:pPr>
+            <a:r>
+              <a:rPr lang="pt-BR" dirty="0"/>
+              <a:t>Usar a capacidade dos dados para realizar um estudo com foco em </a:t>
+            </a:r>
+            <a:r>
+              <a:rPr lang="pt-BR" dirty="0" err="1"/>
+              <a:t>Tuning</a:t>
+            </a:r>
+            <a:r>
+              <a:rPr lang="pt-BR" dirty="0"/>
+              <a:t> de banco de dados.</a:t>
+            </a:r>
+          </a:p>
+          <a:p>
+            <a:pPr lvl="0">
+              <a:lnSpc>
+                <a:spcPct val="110000"/>
+              </a:lnSpc>
+            </a:pPr>
+            <a:r>
+              <a:rPr lang="pt-BR" dirty="0"/>
+              <a:t>Adaptar o banco de dados atual de acordo com o LGPD.</a:t>
+            </a:r>
+          </a:p>
+        </p:txBody>
+      </p:sp>
+    </p:spTree>
+    <p:extLst>
+      <p:ext uri="{BB962C8B-B14F-4D97-AF65-F5344CB8AC3E}">
+        <p14:creationId xmlns:p14="http://schemas.microsoft.com/office/powerpoint/2010/main" val="580782446"/>
+      </p:ext>
+    </p:extLst>
+  </p:cSld>
+  <p:clrMapOvr>
+    <a:masterClrMapping/>
+  </p:clrMapOvr>
+</p:sld>
+</file>
+
+<file path=ppt/slides/slide11.xml><?xml version="1.0" encoding="utf-8"?>
+<p:sld xmlns:a="http://schemas.openxmlformats.org/drawingml/2006/main" xmlns:r="http://schemas.openxmlformats.org/officeDocument/2006/relationships" xmlns:p="http://schemas.openxmlformats.org/presentationml/2006/main">
+  <p:cSld>
+    <p:spTree>
+      <p:nvGrpSpPr>
+        <p:cNvPr id="1" name=""/>
+        <p:cNvGrpSpPr/>
+        <p:nvPr/>
+      </p:nvGrpSpPr>
+      <p:grpSpPr>
+        <a:xfrm>
+          <a:off x="0" y="0"/>
+          <a:ext cx="0" cy="0"/>
+          <a:chOff x="0" y="0"/>
+          <a:chExt cx="0" cy="0"/>
+        </a:xfrm>
+      </p:grpSpPr>
+      <p:sp>
+        <p:nvSpPr>
+          <p:cNvPr id="4" name="Título 3">
+            <a:extLst>
+              <a:ext uri="{FF2B5EF4-FFF2-40B4-BE49-F238E27FC236}">
+                <a16:creationId xmlns:a16="http://schemas.microsoft.com/office/drawing/2014/main" id="{6E1BA72A-980A-4BB4-8D44-217C7B3A4431}"/>
+              </a:ext>
+            </a:extLst>
+          </p:cNvPr>
+          <p:cNvSpPr>
+            <a:spLocks noGrp="1"/>
+          </p:cNvSpPr>
+          <p:nvPr>
+            <p:ph type="ctrTitle"/>
+          </p:nvPr>
+        </p:nvSpPr>
+        <p:spPr/>
+        <p:txBody>
+          <a:bodyPr/>
+          <a:lstStyle/>
+          <a:p>
+            <a:r>
+              <a:rPr lang="pt-BR" dirty="0"/>
+              <a:t>OBRIgado!!</a:t>
+            </a:r>
+          </a:p>
+        </p:txBody>
+      </p:sp>
+    </p:spTree>
+    <p:extLst>
+      <p:ext uri="{BB962C8B-B14F-4D97-AF65-F5344CB8AC3E}">
+        <p14:creationId xmlns:p14="http://schemas.microsoft.com/office/powerpoint/2010/main" val="2185586797"/>
+      </p:ext>
+    </p:extLst>
+  </p:cSld>
+  <p:clrMapOvr>
+    <a:masterClrMapping/>
+  </p:clrMapOvr>
+</p:sld>
+</file>
+
 <file path=ppt/slides/slide2.xml><?xml version="1.0" encoding="utf-8"?>
 <p:sld xmlns:a="http://schemas.openxmlformats.org/drawingml/2006/main" xmlns:r="http://schemas.openxmlformats.org/officeDocument/2006/relationships" xmlns:p="http://schemas.openxmlformats.org/presentationml/2006/main">
   <p:cSld>
@@ -3925,23 +4594,25 @@
           <a:bodyPr/>
           <a:lstStyle/>
           <a:p>
+            <a:pPr algn="just"/>
             <a:r>
               <a:rPr lang="pt-BR" dirty="0"/>
               <a:t>Através da Lei de Acesso à Informação (LAI) cujo a referência é: Lei nº 12.527/2011. Os dados são disponibilizados e podem ser acessar de forma gratuita.</a:t>
             </a:r>
           </a:p>
           <a:p>
+            <a:pPr algn="just"/>
             <a:r>
               <a:rPr lang="pt-BR" dirty="0"/>
-              <a:t>Um dados disponibilizados na área </a:t>
-            </a:r>
-            <a:r>
-              <a:rPr lang="pt-BR"/>
-              <a:t>da educação são os dados do Enem.</a:t>
-            </a:r>
-          </a:p>
-          <a:p>
-            <a:endParaRPr lang="pt-BR" dirty="0"/>
+              <a:t>Um dos dados disponibilizados na área da educação são os dados do Enem.</a:t>
+            </a:r>
+          </a:p>
+          <a:p>
+            <a:pPr algn="just"/>
+            <a:r>
+              <a:rPr lang="pt-BR" dirty="0"/>
+              <a:t>A principal motivação deste trabalho é ampliar o conhecimento sobre o Enem utilizando esses dados que são disponibilizados.</a:t>
+            </a:r>
           </a:p>
         </p:txBody>
       </p:sp>
@@ -3949,6 +4620,834 @@
     <p:extLst>
       <p:ext uri="{BB962C8B-B14F-4D97-AF65-F5344CB8AC3E}">
         <p14:creationId xmlns:p14="http://schemas.microsoft.com/office/powerpoint/2010/main" val="1652980792"/>
+      </p:ext>
+    </p:extLst>
+  </p:cSld>
+  <p:clrMapOvr>
+    <a:masterClrMapping/>
+  </p:clrMapOvr>
+</p:sld>
+</file>
+
+<file path=ppt/slides/slide4.xml><?xml version="1.0" encoding="utf-8"?>
+<p:sld xmlns:a="http://schemas.openxmlformats.org/drawingml/2006/main" xmlns:r="http://schemas.openxmlformats.org/officeDocument/2006/relationships" xmlns:p="http://schemas.openxmlformats.org/presentationml/2006/main">
+  <p:cSld>
+    <p:spTree>
+      <p:nvGrpSpPr>
+        <p:cNvPr id="1" name=""/>
+        <p:cNvGrpSpPr/>
+        <p:nvPr/>
+      </p:nvGrpSpPr>
+      <p:grpSpPr>
+        <a:xfrm>
+          <a:off x="0" y="0"/>
+          <a:ext cx="0" cy="0"/>
+          <a:chOff x="0" y="0"/>
+          <a:chExt cx="0" cy="0"/>
+        </a:xfrm>
+      </p:grpSpPr>
+      <p:sp>
+        <p:nvSpPr>
+          <p:cNvPr id="2" name="Título 1">
+            <a:extLst>
+              <a:ext uri="{FF2B5EF4-FFF2-40B4-BE49-F238E27FC236}">
+                <a16:creationId xmlns:a16="http://schemas.microsoft.com/office/drawing/2014/main" id="{6C8A5F95-9E09-4BE4-A2EB-CB3408597B08}"/>
+              </a:ext>
+            </a:extLst>
+          </p:cNvPr>
+          <p:cNvSpPr>
+            <a:spLocks noGrp="1"/>
+          </p:cNvSpPr>
+          <p:nvPr>
+            <p:ph type="title"/>
+          </p:nvPr>
+        </p:nvSpPr>
+        <p:spPr/>
+        <p:txBody>
+          <a:bodyPr/>
+          <a:lstStyle/>
+          <a:p>
+            <a:r>
+              <a:rPr lang="pt-BR" dirty="0"/>
+              <a:t>Objetivo</a:t>
+            </a:r>
+          </a:p>
+        </p:txBody>
+      </p:sp>
+      <p:sp>
+        <p:nvSpPr>
+          <p:cNvPr id="3" name="Espaço Reservado para Conteúdo 2">
+            <a:extLst>
+              <a:ext uri="{FF2B5EF4-FFF2-40B4-BE49-F238E27FC236}">
+                <a16:creationId xmlns:a16="http://schemas.microsoft.com/office/drawing/2014/main" id="{48245E10-2B3E-4ADC-A72D-44E4C2A9B7A4}"/>
+              </a:ext>
+            </a:extLst>
+          </p:cNvPr>
+          <p:cNvSpPr>
+            <a:spLocks noGrp="1"/>
+          </p:cNvSpPr>
+          <p:nvPr>
+            <p:ph idx="1"/>
+          </p:nvPr>
+        </p:nvSpPr>
+        <p:spPr/>
+        <p:txBody>
+          <a:bodyPr/>
+          <a:lstStyle/>
+          <a:p>
+            <a:pPr algn="just"/>
+            <a:r>
+              <a:rPr lang="pt-BR" dirty="0"/>
+              <a:t>Disponibilizar os dados em banco de dados a ser estudado. </a:t>
+            </a:r>
+          </a:p>
+          <a:p>
+            <a:pPr algn="just"/>
+            <a:r>
+              <a:rPr lang="pt-BR" dirty="0"/>
+              <a:t>Criar banco de dados transacional contém os dados normalizados a cada ano. </a:t>
+            </a:r>
+          </a:p>
+          <a:p>
+            <a:pPr algn="just"/>
+            <a:r>
+              <a:rPr lang="pt-BR" dirty="0"/>
+              <a:t>Criar um DW contém os dados históricos.</a:t>
+            </a:r>
+          </a:p>
+          <a:p>
+            <a:pPr algn="just"/>
+            <a:r>
+              <a:rPr lang="pt-BR" dirty="0"/>
+              <a:t>Criar as </a:t>
+            </a:r>
+            <a:r>
+              <a:rPr lang="pt-BR" dirty="0" err="1"/>
+              <a:t>ETL’s</a:t>
+            </a:r>
+            <a:r>
+              <a:rPr lang="pt-BR" dirty="0"/>
+              <a:t> tanto para o transacional quanto para o DW.</a:t>
+            </a:r>
+          </a:p>
+          <a:p>
+            <a:pPr algn="just"/>
+            <a:r>
+              <a:rPr lang="pt-BR" dirty="0"/>
+              <a:t>Criar os gráficos no PowerBi para a visualização de dados.</a:t>
+            </a:r>
+          </a:p>
+        </p:txBody>
+      </p:sp>
+    </p:spTree>
+    <p:extLst>
+      <p:ext uri="{BB962C8B-B14F-4D97-AF65-F5344CB8AC3E}">
+        <p14:creationId xmlns:p14="http://schemas.microsoft.com/office/powerpoint/2010/main" val="3980846735"/>
+      </p:ext>
+    </p:extLst>
+  </p:cSld>
+  <p:clrMapOvr>
+    <a:masterClrMapping/>
+  </p:clrMapOvr>
+</p:sld>
+</file>
+
+<file path=ppt/slides/slide5.xml><?xml version="1.0" encoding="utf-8"?>
+<p:sld xmlns:a="http://schemas.openxmlformats.org/drawingml/2006/main" xmlns:r="http://schemas.openxmlformats.org/officeDocument/2006/relationships" xmlns:p="http://schemas.openxmlformats.org/presentationml/2006/main">
+  <p:cSld>
+    <p:spTree>
+      <p:nvGrpSpPr>
+        <p:cNvPr id="1" name=""/>
+        <p:cNvGrpSpPr/>
+        <p:nvPr/>
+      </p:nvGrpSpPr>
+      <p:grpSpPr>
+        <a:xfrm>
+          <a:off x="0" y="0"/>
+          <a:ext cx="0" cy="0"/>
+          <a:chOff x="0" y="0"/>
+          <a:chExt cx="0" cy="0"/>
+        </a:xfrm>
+      </p:grpSpPr>
+      <p:sp>
+        <p:nvSpPr>
+          <p:cNvPr id="2" name="Título 1">
+            <a:extLst>
+              <a:ext uri="{FF2B5EF4-FFF2-40B4-BE49-F238E27FC236}">
+                <a16:creationId xmlns:a16="http://schemas.microsoft.com/office/drawing/2014/main" id="{CB3FFAE1-D83D-4A35-BEA7-A04966D75E69}"/>
+              </a:ext>
+            </a:extLst>
+          </p:cNvPr>
+          <p:cNvSpPr>
+            <a:spLocks noGrp="1"/>
+          </p:cNvSpPr>
+          <p:nvPr>
+            <p:ph type="title"/>
+          </p:nvPr>
+        </p:nvSpPr>
+        <p:spPr/>
+        <p:txBody>
+          <a:bodyPr/>
+          <a:lstStyle/>
+          <a:p>
+            <a:r>
+              <a:rPr lang="pt-BR" dirty="0"/>
+              <a:t>O que é o </a:t>
+            </a:r>
+            <a:r>
+              <a:rPr lang="pt-BR" dirty="0" err="1"/>
+              <a:t>enem</a:t>
+            </a:r>
+            <a:r>
+              <a:rPr lang="pt-BR" dirty="0"/>
+              <a:t>?</a:t>
+            </a:r>
+          </a:p>
+        </p:txBody>
+      </p:sp>
+      <p:sp>
+        <p:nvSpPr>
+          <p:cNvPr id="3" name="Espaço Reservado para Conteúdo 2">
+            <a:extLst>
+              <a:ext uri="{FF2B5EF4-FFF2-40B4-BE49-F238E27FC236}">
+                <a16:creationId xmlns:a16="http://schemas.microsoft.com/office/drawing/2014/main" id="{CF3F8C7A-EC56-4447-AACF-498405F209E7}"/>
+              </a:ext>
+            </a:extLst>
+          </p:cNvPr>
+          <p:cNvSpPr>
+            <a:spLocks noGrp="1"/>
+          </p:cNvSpPr>
+          <p:nvPr>
+            <p:ph idx="1"/>
+          </p:nvPr>
+        </p:nvSpPr>
+        <p:spPr>
+          <a:xfrm>
+            <a:off x="2231136" y="2359152"/>
+            <a:ext cx="7729728" cy="3380875"/>
+          </a:xfrm>
+        </p:spPr>
+        <p:txBody>
+          <a:bodyPr/>
+          <a:lstStyle/>
+          <a:p>
+            <a:pPr algn="just"/>
+            <a:r>
+              <a:rPr lang="pt-BR" dirty="0"/>
+              <a:t>Exame Nacional de Ensino Médio que tem por objetivo avaliar a qualidade do Ensino Médio Brasileiro. </a:t>
+            </a:r>
+          </a:p>
+          <a:p>
+            <a:pPr algn="just"/>
+            <a:r>
+              <a:rPr lang="pt-BR" dirty="0"/>
+              <a:t>As provas são divididas em: Ciência da Natureza, Ciência Humanas, Linguagens e Códigos (com a Redação).</a:t>
+            </a:r>
+          </a:p>
+          <a:p>
+            <a:r>
+              <a:rPr lang="pt-BR" dirty="0"/>
+              <a:t>O exame contém ao total 180 questões objetivas e uma prova discursa.</a:t>
+            </a:r>
+          </a:p>
+          <a:p>
+            <a:r>
+              <a:rPr lang="pt-BR" dirty="0"/>
+              <a:t>As provas são dividas em cores como: amarela, azul, branca e rosa, porém as cores podem mudar de acordo com o ano.</a:t>
+            </a:r>
+          </a:p>
+        </p:txBody>
+      </p:sp>
+    </p:spTree>
+    <p:extLst>
+      <p:ext uri="{BB962C8B-B14F-4D97-AF65-F5344CB8AC3E}">
+        <p14:creationId xmlns:p14="http://schemas.microsoft.com/office/powerpoint/2010/main" val="1380718363"/>
+      </p:ext>
+    </p:extLst>
+  </p:cSld>
+  <p:clrMapOvr>
+    <a:masterClrMapping/>
+  </p:clrMapOvr>
+</p:sld>
+</file>
+
+<file path=ppt/slides/slide6.xml><?xml version="1.0" encoding="utf-8"?>
+<p:sld xmlns:a="http://schemas.openxmlformats.org/drawingml/2006/main" xmlns:r="http://schemas.openxmlformats.org/officeDocument/2006/relationships" xmlns:p="http://schemas.openxmlformats.org/presentationml/2006/main">
+  <p:cSld>
+    <p:spTree>
+      <p:nvGrpSpPr>
+        <p:cNvPr id="1" name=""/>
+        <p:cNvGrpSpPr/>
+        <p:nvPr/>
+      </p:nvGrpSpPr>
+      <p:grpSpPr>
+        <a:xfrm>
+          <a:off x="0" y="0"/>
+          <a:ext cx="0" cy="0"/>
+          <a:chOff x="0" y="0"/>
+          <a:chExt cx="0" cy="0"/>
+        </a:xfrm>
+      </p:grpSpPr>
+      <p:sp>
+        <p:nvSpPr>
+          <p:cNvPr id="2" name="Título 1">
+            <a:extLst>
+              <a:ext uri="{FF2B5EF4-FFF2-40B4-BE49-F238E27FC236}">
+                <a16:creationId xmlns:a16="http://schemas.microsoft.com/office/drawing/2014/main" id="{27A9E124-2A85-4DCA-B085-C790C652574B}"/>
+              </a:ext>
+            </a:extLst>
+          </p:cNvPr>
+          <p:cNvSpPr>
+            <a:spLocks noGrp="1"/>
+          </p:cNvSpPr>
+          <p:nvPr>
+            <p:ph type="title"/>
+          </p:nvPr>
+        </p:nvSpPr>
+        <p:spPr>
+          <a:xfrm>
+            <a:off x="2417749" y="1"/>
+            <a:ext cx="7729728" cy="578498"/>
+          </a:xfrm>
+        </p:spPr>
+        <p:txBody>
+          <a:bodyPr>
+            <a:normAutofit fontScale="90000"/>
+          </a:bodyPr>
+          <a:lstStyle/>
+          <a:p>
+            <a:r>
+              <a:rPr lang="pt-BR" dirty="0"/>
+              <a:t>MODELO CONCEITUAL</a:t>
+            </a:r>
+          </a:p>
+        </p:txBody>
+      </p:sp>
+      <p:pic>
+        <p:nvPicPr>
+          <p:cNvPr id="4" name="Imagem 3" descr="Diagrama, Esquemático&#10;&#10;Descrição gerada automaticamente">
+            <a:extLst>
+              <a:ext uri="{FF2B5EF4-FFF2-40B4-BE49-F238E27FC236}">
+                <a16:creationId xmlns:a16="http://schemas.microsoft.com/office/drawing/2014/main" id="{0723FB66-1A7E-46FA-AE76-CB81EB8A287E}"/>
+              </a:ext>
+            </a:extLst>
+          </p:cNvPr>
+          <p:cNvPicPr>
+            <a:picLocks noChangeAspect="1"/>
+          </p:cNvPicPr>
+          <p:nvPr/>
+        </p:nvPicPr>
+        <p:blipFill>
+          <a:blip r:embed="rId2">
+            <a:extLst>
+              <a:ext uri="{28A0092B-C50C-407E-A947-70E740481C1C}">
+                <a14:useLocalDpi xmlns:a14="http://schemas.microsoft.com/office/drawing/2010/main" val="0"/>
+              </a:ext>
+            </a:extLst>
+          </a:blip>
+          <a:stretch>
+            <a:fillRect/>
+          </a:stretch>
+        </p:blipFill>
+        <p:spPr>
+          <a:xfrm>
+            <a:off x="0" y="662474"/>
+            <a:ext cx="12192000" cy="6195526"/>
+          </a:xfrm>
+          <a:prstGeom prst="rect">
+            <a:avLst/>
+          </a:prstGeom>
+        </p:spPr>
+      </p:pic>
+    </p:spTree>
+    <p:extLst>
+      <p:ext uri="{BB962C8B-B14F-4D97-AF65-F5344CB8AC3E}">
+        <p14:creationId xmlns:p14="http://schemas.microsoft.com/office/powerpoint/2010/main" val="2125985074"/>
+      </p:ext>
+    </p:extLst>
+  </p:cSld>
+  <p:clrMapOvr>
+    <a:masterClrMapping/>
+  </p:clrMapOvr>
+</p:sld>
+</file>
+
+<file path=ppt/slides/slide7.xml><?xml version="1.0" encoding="utf-8"?>
+<p:sld xmlns:a="http://schemas.openxmlformats.org/drawingml/2006/main" xmlns:r="http://schemas.openxmlformats.org/officeDocument/2006/relationships" xmlns:p="http://schemas.openxmlformats.org/presentationml/2006/main">
+  <p:cSld>
+    <p:spTree>
+      <p:nvGrpSpPr>
+        <p:cNvPr id="1" name=""/>
+        <p:cNvGrpSpPr/>
+        <p:nvPr/>
+      </p:nvGrpSpPr>
+      <p:grpSpPr>
+        <a:xfrm>
+          <a:off x="0" y="0"/>
+          <a:ext cx="0" cy="0"/>
+          <a:chOff x="0" y="0"/>
+          <a:chExt cx="0" cy="0"/>
+        </a:xfrm>
+      </p:grpSpPr>
+      <p:sp>
+        <p:nvSpPr>
+          <p:cNvPr id="2" name="Título 1">
+            <a:extLst>
+              <a:ext uri="{FF2B5EF4-FFF2-40B4-BE49-F238E27FC236}">
+                <a16:creationId xmlns:a16="http://schemas.microsoft.com/office/drawing/2014/main" id="{DEA205FE-3801-415D-B3CF-AC68802183C2}"/>
+              </a:ext>
+            </a:extLst>
+          </p:cNvPr>
+          <p:cNvSpPr>
+            <a:spLocks noGrp="1"/>
+          </p:cNvSpPr>
+          <p:nvPr>
+            <p:ph type="title"/>
+          </p:nvPr>
+        </p:nvSpPr>
+        <p:spPr>
+          <a:xfrm>
+            <a:off x="2231135" y="65315"/>
+            <a:ext cx="7729728" cy="569168"/>
+          </a:xfrm>
+        </p:spPr>
+        <p:txBody>
+          <a:bodyPr>
+            <a:normAutofit fontScale="90000"/>
+          </a:bodyPr>
+          <a:lstStyle/>
+          <a:p>
+            <a:r>
+              <a:rPr lang="pt-BR" dirty="0"/>
+              <a:t>MODELO lógico</a:t>
+            </a:r>
+          </a:p>
+        </p:txBody>
+      </p:sp>
+      <p:pic>
+        <p:nvPicPr>
+          <p:cNvPr id="5" name="Imagem 4" descr="Diagrama&#10;&#10;Descrição gerada automaticamente">
+            <a:extLst>
+              <a:ext uri="{FF2B5EF4-FFF2-40B4-BE49-F238E27FC236}">
+                <a16:creationId xmlns:a16="http://schemas.microsoft.com/office/drawing/2014/main" id="{762F17E1-BEE4-4F33-BE89-A17CD547582A}"/>
+              </a:ext>
+            </a:extLst>
+          </p:cNvPr>
+          <p:cNvPicPr>
+            <a:picLocks noChangeAspect="1"/>
+          </p:cNvPicPr>
+          <p:nvPr/>
+        </p:nvPicPr>
+        <p:blipFill>
+          <a:blip r:embed="rId3">
+            <a:extLst>
+              <a:ext uri="{28A0092B-C50C-407E-A947-70E740481C1C}">
+                <a14:useLocalDpi xmlns:a14="http://schemas.microsoft.com/office/drawing/2010/main" val="0"/>
+              </a:ext>
+            </a:extLst>
+          </a:blip>
+          <a:stretch>
+            <a:fillRect/>
+          </a:stretch>
+        </p:blipFill>
+        <p:spPr>
+          <a:xfrm>
+            <a:off x="1" y="718457"/>
+            <a:ext cx="12192000" cy="6074229"/>
+          </a:xfrm>
+          <a:prstGeom prst="rect">
+            <a:avLst/>
+          </a:prstGeom>
+        </p:spPr>
+      </p:pic>
+    </p:spTree>
+    <p:extLst>
+      <p:ext uri="{BB962C8B-B14F-4D97-AF65-F5344CB8AC3E}">
+        <p14:creationId xmlns:p14="http://schemas.microsoft.com/office/powerpoint/2010/main" val="2348554424"/>
+      </p:ext>
+    </p:extLst>
+  </p:cSld>
+  <p:clrMapOvr>
+    <a:masterClrMapping/>
+  </p:clrMapOvr>
+</p:sld>
+</file>
+
+<file path=ppt/slides/slide8.xml><?xml version="1.0" encoding="utf-8"?>
+<p:sld xmlns:a="http://schemas.openxmlformats.org/drawingml/2006/main" xmlns:r="http://schemas.openxmlformats.org/officeDocument/2006/relationships" xmlns:p="http://schemas.openxmlformats.org/presentationml/2006/main">
+  <p:cSld>
+    <p:spTree>
+      <p:nvGrpSpPr>
+        <p:cNvPr id="1" name=""/>
+        <p:cNvGrpSpPr/>
+        <p:nvPr/>
+      </p:nvGrpSpPr>
+      <p:grpSpPr>
+        <a:xfrm>
+          <a:off x="0" y="0"/>
+          <a:ext cx="0" cy="0"/>
+          <a:chOff x="0" y="0"/>
+          <a:chExt cx="0" cy="0"/>
+        </a:xfrm>
+      </p:grpSpPr>
+      <p:sp>
+        <p:nvSpPr>
+          <p:cNvPr id="2" name="Título 1">
+            <a:extLst>
+              <a:ext uri="{FF2B5EF4-FFF2-40B4-BE49-F238E27FC236}">
+                <a16:creationId xmlns:a16="http://schemas.microsoft.com/office/drawing/2014/main" id="{B89C9709-FA34-4CD6-8FA2-8861B8B7D31A}"/>
+              </a:ext>
+            </a:extLst>
+          </p:cNvPr>
+          <p:cNvSpPr>
+            <a:spLocks noGrp="1"/>
+          </p:cNvSpPr>
+          <p:nvPr>
+            <p:ph type="title"/>
+          </p:nvPr>
+        </p:nvSpPr>
+        <p:spPr/>
+        <p:txBody>
+          <a:bodyPr/>
+          <a:lstStyle/>
+          <a:p>
+            <a:r>
+              <a:rPr lang="pt-BR" dirty="0"/>
+              <a:t>resultados</a:t>
+            </a:r>
+          </a:p>
+        </p:txBody>
+      </p:sp>
+      <p:sp>
+        <p:nvSpPr>
+          <p:cNvPr id="3" name="Espaço Reservado para Conteúdo 2">
+            <a:extLst>
+              <a:ext uri="{FF2B5EF4-FFF2-40B4-BE49-F238E27FC236}">
+                <a16:creationId xmlns:a16="http://schemas.microsoft.com/office/drawing/2014/main" id="{FE487595-0C4A-47C0-9340-617A5A8351FB}"/>
+              </a:ext>
+            </a:extLst>
+          </p:cNvPr>
+          <p:cNvSpPr>
+            <a:spLocks noGrp="1"/>
+          </p:cNvSpPr>
+          <p:nvPr>
+            <p:ph idx="1"/>
+          </p:nvPr>
+        </p:nvSpPr>
+        <p:spPr/>
+        <p:txBody>
+          <a:bodyPr/>
+          <a:lstStyle/>
+          <a:p>
+            <a:r>
+              <a:rPr lang="pt-BR" dirty="0"/>
+              <a:t>Respostas das perguntas que foram base do DW.</a:t>
+            </a:r>
+          </a:p>
+          <a:p>
+            <a:r>
+              <a:rPr lang="pt-BR" dirty="0"/>
+              <a:t>Disponibilização de uma infraestrutura fim-a-fim para os dados DW.</a:t>
+            </a:r>
+          </a:p>
+          <a:p>
+            <a:r>
+              <a:rPr lang="pt-BR" dirty="0"/>
+              <a:t>Visualização de dados através dos gráficos gerados pela ferramenta </a:t>
+            </a:r>
+            <a:r>
+              <a:rPr lang="pt-BR" i="1" dirty="0"/>
+              <a:t>PowerBi</a:t>
+            </a:r>
+            <a:r>
+              <a:rPr lang="pt-BR" dirty="0"/>
+              <a:t>.</a:t>
+            </a:r>
+          </a:p>
+          <a:p>
+            <a:r>
+              <a:rPr lang="pt-BR" dirty="0"/>
+              <a:t>A análise de desempenho do DW: </a:t>
+            </a:r>
+            <a:br>
+              <a:rPr lang="pt-BR" dirty="0"/>
+            </a:br>
+            <a:r>
+              <a:rPr lang="pt-BR" dirty="0"/>
+              <a:t>Média dos alunos agrupados por: estado, área da prova e ano do Enem.</a:t>
+            </a:r>
+            <a:br>
+              <a:rPr lang="pt-BR" dirty="0"/>
+            </a:br>
+            <a:endParaRPr lang="pt-BR" dirty="0"/>
+          </a:p>
+        </p:txBody>
+      </p:sp>
+      <p:graphicFrame>
+        <p:nvGraphicFramePr>
+          <p:cNvPr id="4" name="Tabela 4">
+            <a:extLst>
+              <a:ext uri="{FF2B5EF4-FFF2-40B4-BE49-F238E27FC236}">
+                <a16:creationId xmlns:a16="http://schemas.microsoft.com/office/drawing/2014/main" id="{9FBDF2C0-7D64-4A95-B57C-92DC0E63C6E3}"/>
+              </a:ext>
+            </a:extLst>
+          </p:cNvPr>
+          <p:cNvGraphicFramePr>
+            <a:graphicFrameLocks noGrp="1"/>
+          </p:cNvGraphicFramePr>
+          <p:nvPr>
+            <p:extLst>
+              <p:ext uri="{D42A27DB-BD31-4B8C-83A1-F6EECF244321}">
+                <p14:modId xmlns:p14="http://schemas.microsoft.com/office/powerpoint/2010/main" val="1045072540"/>
+              </p:ext>
+            </p:extLst>
+          </p:nvPr>
+        </p:nvGraphicFramePr>
+        <p:xfrm>
+          <a:off x="2497328" y="4442290"/>
+          <a:ext cx="6975856" cy="731520"/>
+        </p:xfrm>
+        <a:graphic>
+          <a:graphicData uri="http://schemas.openxmlformats.org/drawingml/2006/table">
+            <a:tbl>
+              <a:tblPr firstRow="1" bandRow="1">
+                <a:tableStyleId>{5C22544A-7EE6-4342-B048-85BDC9FD1C3A}</a:tableStyleId>
+              </a:tblPr>
+              <a:tblGrid>
+                <a:gridCol w="3487928">
+                  <a:extLst>
+                    <a:ext uri="{9D8B030D-6E8A-4147-A177-3AD203B41FA5}">
+                      <a16:colId xmlns:a16="http://schemas.microsoft.com/office/drawing/2014/main" val="3761727199"/>
+                    </a:ext>
+                  </a:extLst>
+                </a:gridCol>
+                <a:gridCol w="3487928">
+                  <a:extLst>
+                    <a:ext uri="{9D8B030D-6E8A-4147-A177-3AD203B41FA5}">
+                      <a16:colId xmlns:a16="http://schemas.microsoft.com/office/drawing/2014/main" val="1451528394"/>
+                    </a:ext>
+                  </a:extLst>
+                </a:gridCol>
+              </a:tblGrid>
+              <a:tr h="0">
+                <a:tc>
+                  <a:txBody>
+                    <a:bodyPr/>
+                    <a:lstStyle/>
+                    <a:p>
+                      <a:pPr algn="ctr"/>
+                      <a:r>
+                        <a:rPr lang="pt-BR" b="0" dirty="0">
+                          <a:solidFill>
+                            <a:schemeClr val="tx1"/>
+                          </a:solidFill>
+                        </a:rPr>
+                        <a:t>Transacional</a:t>
+                      </a:r>
+                    </a:p>
+                  </a:txBody>
+                  <a:tcPr>
+                    <a:noFill/>
+                  </a:tcPr>
+                </a:tc>
+                <a:tc>
+                  <a:txBody>
+                    <a:bodyPr/>
+                    <a:lstStyle/>
+                    <a:p>
+                      <a:pPr algn="ctr"/>
+                      <a:r>
+                        <a:rPr lang="pt-BR" b="0" dirty="0">
+                          <a:solidFill>
+                            <a:schemeClr val="tx1"/>
+                          </a:solidFill>
+                        </a:rPr>
+                        <a:t>DW</a:t>
+                      </a:r>
+                    </a:p>
+                  </a:txBody>
+                  <a:tcPr>
+                    <a:noFill/>
+                  </a:tcPr>
+                </a:tc>
+                <a:extLst>
+                  <a:ext uri="{0D108BD9-81ED-4DB2-BD59-A6C34878D82A}">
+                    <a16:rowId xmlns:a16="http://schemas.microsoft.com/office/drawing/2014/main" val="3380088079"/>
+                  </a:ext>
+                </a:extLst>
+              </a:tr>
+              <a:tr h="0">
+                <a:tc>
+                  <a:txBody>
+                    <a:bodyPr/>
+                    <a:lstStyle/>
+                    <a:p>
+                      <a:pPr algn="ctr"/>
+                      <a:r>
+                        <a:rPr lang="pt-BR" dirty="0"/>
+                        <a:t>3 min</a:t>
+                      </a:r>
+                    </a:p>
+                  </a:txBody>
+                  <a:tcPr>
+                    <a:noFill/>
+                  </a:tcPr>
+                </a:tc>
+                <a:tc>
+                  <a:txBody>
+                    <a:bodyPr/>
+                    <a:lstStyle/>
+                    <a:p>
+                      <a:pPr marL="0" marR="0" lvl="0" indent="0" algn="ctr" defTabSz="914400" rtl="0" eaLnBrk="1" fontAlgn="auto" latinLnBrk="0" hangingPunct="1">
+                        <a:lnSpc>
+                          <a:spcPct val="100000"/>
+                        </a:lnSpc>
+                        <a:spcBef>
+                          <a:spcPts val="0"/>
+                        </a:spcBef>
+                        <a:spcAft>
+                          <a:spcPts val="0"/>
+                        </a:spcAft>
+                        <a:buClrTx/>
+                        <a:buSzTx/>
+                        <a:buFontTx/>
+                        <a:buNone/>
+                        <a:tabLst/>
+                        <a:defRPr/>
+                      </a:pPr>
+                      <a:r>
+                        <a:rPr lang="pt-BR" dirty="0"/>
+                        <a:t>1min 9 </a:t>
+                      </a:r>
+                      <a:r>
+                        <a:rPr lang="pt-BR" dirty="0" err="1"/>
+                        <a:t>secs</a:t>
+                      </a:r>
+                      <a:endParaRPr lang="pt-BR" dirty="0"/>
+                    </a:p>
+                  </a:txBody>
+                  <a:tcPr>
+                    <a:noFill/>
+                  </a:tcPr>
+                </a:tc>
+                <a:extLst>
+                  <a:ext uri="{0D108BD9-81ED-4DB2-BD59-A6C34878D82A}">
+                    <a16:rowId xmlns:a16="http://schemas.microsoft.com/office/drawing/2014/main" val="936073560"/>
+                  </a:ext>
+                </a:extLst>
+              </a:tr>
+            </a:tbl>
+          </a:graphicData>
+        </a:graphic>
+      </p:graphicFrame>
+    </p:spTree>
+    <p:extLst>
+      <p:ext uri="{BB962C8B-B14F-4D97-AF65-F5344CB8AC3E}">
+        <p14:creationId xmlns:p14="http://schemas.microsoft.com/office/powerpoint/2010/main" val="2995042864"/>
+      </p:ext>
+    </p:extLst>
+  </p:cSld>
+  <p:clrMapOvr>
+    <a:masterClrMapping/>
+  </p:clrMapOvr>
+</p:sld>
+</file>
+
+<file path=ppt/slides/slide9.xml><?xml version="1.0" encoding="utf-8"?>
+<p:sld xmlns:a="http://schemas.openxmlformats.org/drawingml/2006/main" xmlns:r="http://schemas.openxmlformats.org/officeDocument/2006/relationships" xmlns:p="http://schemas.openxmlformats.org/presentationml/2006/main">
+  <p:cSld>
+    <p:spTree>
+      <p:nvGrpSpPr>
+        <p:cNvPr id="1" name=""/>
+        <p:cNvGrpSpPr/>
+        <p:nvPr/>
+      </p:nvGrpSpPr>
+      <p:grpSpPr>
+        <a:xfrm>
+          <a:off x="0" y="0"/>
+          <a:ext cx="0" cy="0"/>
+          <a:chOff x="0" y="0"/>
+          <a:chExt cx="0" cy="0"/>
+        </a:xfrm>
+      </p:grpSpPr>
+      <p:sp>
+        <p:nvSpPr>
+          <p:cNvPr id="2" name="Título 1">
+            <a:extLst>
+              <a:ext uri="{FF2B5EF4-FFF2-40B4-BE49-F238E27FC236}">
+                <a16:creationId xmlns:a16="http://schemas.microsoft.com/office/drawing/2014/main" id="{46A95C4D-FEDB-4D6F-9A85-8D656F0138B4}"/>
+              </a:ext>
+            </a:extLst>
+          </p:cNvPr>
+          <p:cNvSpPr>
+            <a:spLocks noGrp="1"/>
+          </p:cNvSpPr>
+          <p:nvPr>
+            <p:ph type="title"/>
+          </p:nvPr>
+        </p:nvSpPr>
+        <p:spPr/>
+        <p:txBody>
+          <a:bodyPr/>
+          <a:lstStyle/>
+          <a:p>
+            <a:r>
+              <a:rPr lang="pt-BR" dirty="0"/>
+              <a:t>Limitações</a:t>
+            </a:r>
+          </a:p>
+        </p:txBody>
+      </p:sp>
+      <p:sp>
+        <p:nvSpPr>
+          <p:cNvPr id="3" name="Espaço Reservado para Conteúdo 2">
+            <a:extLst>
+              <a:ext uri="{FF2B5EF4-FFF2-40B4-BE49-F238E27FC236}">
+                <a16:creationId xmlns:a16="http://schemas.microsoft.com/office/drawing/2014/main" id="{73190E5A-FB2B-41E3-8959-40D8E8B89DC5}"/>
+              </a:ext>
+            </a:extLst>
+          </p:cNvPr>
+          <p:cNvSpPr>
+            <a:spLocks noGrp="1"/>
+          </p:cNvSpPr>
+          <p:nvPr>
+            <p:ph idx="1"/>
+          </p:nvPr>
+        </p:nvSpPr>
+        <p:spPr/>
+        <p:txBody>
+          <a:bodyPr/>
+          <a:lstStyle/>
+          <a:p>
+            <a:r>
+              <a:rPr lang="pt-BR" dirty="0"/>
+              <a:t>Padronização dos dados.</a:t>
+            </a:r>
+          </a:p>
+          <a:p>
+            <a:r>
+              <a:rPr lang="pt-BR" dirty="0"/>
+              <a:t>Criação da infraestrutura.</a:t>
+            </a:r>
+          </a:p>
+          <a:p>
+            <a:r>
+              <a:rPr lang="pt-BR" dirty="0"/>
+              <a:t>Armazenamento dos dados.</a:t>
+            </a:r>
+          </a:p>
+          <a:p>
+            <a:r>
+              <a:rPr lang="pt-BR" dirty="0"/>
+              <a:t>Capacidade de processamento dos dados.</a:t>
+            </a:r>
+          </a:p>
+        </p:txBody>
+      </p:sp>
+    </p:spTree>
+    <p:extLst>
+      <p:ext uri="{BB962C8B-B14F-4D97-AF65-F5344CB8AC3E}">
+        <p14:creationId xmlns:p14="http://schemas.microsoft.com/office/powerpoint/2010/main" val="493301709"/>
       </p:ext>
     </p:extLst>
   </p:cSld>
@@ -4216,4 +5715,299 @@
     </a:ext>
   </a:extLst>
 </a:theme>
+</file>
+
+<file path=ppt/theme/theme2.xml><?xml version="1.0" encoding="utf-8"?>
+<a:theme xmlns:a="http://schemas.openxmlformats.org/drawingml/2006/main" name="Tema do Office">
+  <a:themeElements>
+    <a:clrScheme name="Office">
+      <a:dk1>
+        <a:sysClr val="windowText" lastClr="000000"/>
+      </a:dk1>
+      <a:lt1>
+        <a:sysClr val="window" lastClr="FFFFFF"/>
+      </a:lt1>
+      <a:dk2>
+        <a:srgbClr val="44546A"/>
+      </a:dk2>
+      <a:lt2>
+        <a:srgbClr val="E7E6E6"/>
+      </a:lt2>
+      <a:accent1>
+        <a:srgbClr val="4472C4"/>
+      </a:accent1>
+      <a:accent2>
+        <a:srgbClr val="ED7D31"/>
+      </a:accent2>
+      <a:accent3>
+        <a:srgbClr val="A5A5A5"/>
+      </a:accent3>
+      <a:accent4>
+        <a:srgbClr val="FFC000"/>
+      </a:accent4>
+      <a:accent5>
+        <a:srgbClr val="5B9BD5"/>
+      </a:accent5>
+      <a:accent6>
+        <a:srgbClr val="70AD47"/>
+      </a:accent6>
+      <a:hlink>
+        <a:srgbClr val="0563C1"/>
+      </a:hlink>
+      <a:folHlink>
+        <a:srgbClr val="954F72"/>
+      </a:folHlink>
+    </a:clrScheme>
+    <a:fontScheme name="Office">
+      <a:majorFont>
+        <a:latin typeface="Calibri Light" panose="020F0302020204030204"/>
+        <a:ea typeface=""/>
+        <a:cs typeface=""/>
+        <a:font script="Jpan" typeface="游ゴシック Light"/>
+        <a:font script="Hang" typeface="맑은 고딕"/>
+        <a:font script="Hans" typeface="等线 Light"/>
+        <a:font script="Hant" typeface="新細明體"/>
+        <a:font script="Arab" typeface="Times New Roman"/>
+        <a:font script="Hebr" typeface="Times New Roman"/>
+        <a:font script="Thai" typeface="Angsana New"/>
+        <a:font script="Ethi" typeface="Nyala"/>
+        <a:font script="Beng" typeface="Vrinda"/>
+        <a:font script="Gujr" typeface="Shruti"/>
+        <a:font script="Khmr" typeface="MoolBoran"/>
+        <a:font script="Knda" typeface="Tunga"/>
+        <a:font script="Guru" typeface="Raavi"/>
+        <a:font script="Cans" typeface="Euphemia"/>
+        <a:font script="Cher" typeface="Plantagenet Cherokee"/>
+        <a:font script="Yiii" typeface="Microsoft Yi Baiti"/>
+        <a:font script="Tibt" typeface="Microsoft Himalaya"/>
+        <a:font script="Thaa" typeface="MV Boli"/>
+        <a:font script="Deva" typeface="Mangal"/>
+        <a:font script="Telu" typeface="Gautami"/>
+        <a:font script="Taml" typeface="Latha"/>
+        <a:font script="Syrc" typeface="Estrangelo Edessa"/>
+        <a:font script="Orya" typeface="Kalinga"/>
+        <a:font script="Mlym" typeface="Kartika"/>
+        <a:font script="Laoo" typeface="DokChampa"/>
+        <a:font script="Sinh" typeface="Iskoola Pota"/>
+        <a:font script="Mong" typeface="Mongolian Baiti"/>
+        <a:font script="Viet" typeface="Times New Roman"/>
+        <a:font script="Uigh" typeface="Microsoft Uighur"/>
+        <a:font script="Geor" typeface="Sylfaen"/>
+        <a:font script="Armn" typeface="Arial"/>
+        <a:font script="Bugi" typeface="Leelawadee UI"/>
+        <a:font script="Bopo" typeface="Microsoft JhengHei"/>
+        <a:font script="Java" typeface="Javanese Text"/>
+        <a:font script="Lisu" typeface="Segoe UI"/>
+        <a:font script="Mymr" typeface="Myanmar Text"/>
+        <a:font script="Nkoo" typeface="Ebrima"/>
+        <a:font script="Olck" typeface="Nirmala UI"/>
+        <a:font script="Osma" typeface="Ebrima"/>
+        <a:font script="Phag" typeface="Phagspa"/>
+        <a:font script="Syrn" typeface="Estrangelo Edessa"/>
+        <a:font script="Syrj" typeface="Estrangelo Edessa"/>
+        <a:font script="Syre" typeface="Estrangelo Edessa"/>
+        <a:font script="Sora" typeface="Nirmala UI"/>
+        <a:font script="Tale" typeface="Microsoft Tai Le"/>
+        <a:font script="Talu" typeface="Microsoft New Tai Lue"/>
+        <a:font script="Tfng" typeface="Ebrima"/>
+      </a:majorFont>
+      <a:minorFont>
+        <a:latin typeface="Calibri" panose="020F0502020204030204"/>
+        <a:ea typeface=""/>
+        <a:cs typeface=""/>
+        <a:font script="Jpan" typeface="游ゴシック"/>
+        <a:font script="Hang" typeface="맑은 고딕"/>
+        <a:font script="Hans" typeface="等线"/>
+        <a:font script="Hant" typeface="新細明體"/>
+        <a:font script="Arab" typeface="Arial"/>
+        <a:font script="Hebr" typeface="Arial"/>
+        <a:font script="Thai" typeface="Cordia New"/>
+        <a:font script="Ethi" typeface="Nyala"/>
+        <a:font script="Beng" typeface="Vrinda"/>
+        <a:font script="Gujr" typeface="Shruti"/>
+        <a:font script="Khmr" typeface="DaunPenh"/>
+        <a:font script="Knda" typeface="Tunga"/>
+        <a:font script="Guru" typeface="Raavi"/>
+        <a:font script="Cans" typeface="Euphemia"/>
+        <a:font script="Cher" typeface="Plantagenet Cherokee"/>
+        <a:font script="Yiii" typeface="Microsoft Yi Baiti"/>
+        <a:font script="Tibt" typeface="Microsoft Himalaya"/>
+        <a:font script="Thaa" typeface="MV Boli"/>
+        <a:font script="Deva" typeface="Mangal"/>
+        <a:font script="Telu" typeface="Gautami"/>
+        <a:font script="Taml" typeface="Latha"/>
+        <a:font script="Syrc" typeface="Estrangelo Edessa"/>
+        <a:font script="Orya" typeface="Kalinga"/>
+        <a:font script="Mlym" typeface="Kartika"/>
+        <a:font script="Laoo" typeface="DokChampa"/>
+        <a:font script="Sinh" typeface="Iskoola Pota"/>
+        <a:font script="Mong" typeface="Mongolian Baiti"/>
+        <a:font script="Viet" typeface="Arial"/>
+        <a:font script="Uigh" typeface="Microsoft Uighur"/>
+        <a:font script="Geor" typeface="Sylfaen"/>
+        <a:font script="Armn" typeface="Arial"/>
+        <a:font script="Bugi" typeface="Leelawadee UI"/>
+        <a:font script="Bopo" typeface="Microsoft JhengHei"/>
+        <a:font script="Java" typeface="Javanese Text"/>
+        <a:font script="Lisu" typeface="Segoe UI"/>
+        <a:font script="Mymr" typeface="Myanmar Text"/>
+        <a:font script="Nkoo" typeface="Ebrima"/>
+        <a:font script="Olck" typeface="Nirmala UI"/>
+        <a:font script="Osma" typeface="Ebrima"/>
+        <a:font script="Phag" typeface="Phagspa"/>
+        <a:font script="Syrn" typeface="Estrangelo Edessa"/>
+        <a:font script="Syrj" typeface="Estrangelo Edessa"/>
+        <a:font script="Syre" typeface="Estrangelo Edessa"/>
+        <a:font script="Sora" typeface="Nirmala UI"/>
+        <a:font script="Tale" typeface="Microsoft Tai Le"/>
+        <a:font script="Talu" typeface="Microsoft New Tai Lue"/>
+        <a:font script="Tfng" typeface="Ebrima"/>
+      </a:minorFont>
+    </a:fontScheme>
+    <a:fmtScheme name="Office">
+      <a:fillStyleLst>
+        <a:solidFill>
+          <a:schemeClr val="phClr"/>
+        </a:solidFill>
+        <a:gradFill rotWithShape="1">
+          <a:gsLst>
+            <a:gs pos="0">
+              <a:schemeClr val="phClr">
+                <a:lumMod val="110000"/>
+                <a:satMod val="105000"/>
+                <a:tint val="67000"/>
+              </a:schemeClr>
+            </a:gs>
+            <a:gs pos="50000">
+              <a:schemeClr val="phClr">
+                <a:lumMod val="105000"/>
+                <a:satMod val="103000"/>
+                <a:tint val="73000"/>
+              </a:schemeClr>
+            </a:gs>
+            <a:gs pos="100000">
+              <a:schemeClr val="phClr">
+                <a:lumMod val="105000"/>
+                <a:satMod val="109000"/>
+                <a:tint val="81000"/>
+              </a:schemeClr>
+            </a:gs>
+          </a:gsLst>
+          <a:lin ang="5400000" scaled="0"/>
+        </a:gradFill>
+        <a:gradFill rotWithShape="1">
+          <a:gsLst>
+            <a:gs pos="0">
+              <a:schemeClr val="phClr">
+                <a:satMod val="103000"/>
+                <a:lumMod val="102000"/>
+                <a:tint val="94000"/>
+              </a:schemeClr>
+            </a:gs>
+            <a:gs pos="50000">
+              <a:schemeClr val="phClr">
+                <a:satMod val="110000"/>
+                <a:lumMod val="100000"/>
+                <a:shade val="100000"/>
+              </a:schemeClr>
+            </a:gs>
+            <a:gs pos="100000">
+              <a:schemeClr val="phClr">
+                <a:lumMod val="99000"/>
+                <a:satMod val="120000"/>
+                <a:shade val="78000"/>
+              </a:schemeClr>
+            </a:gs>
+          </a:gsLst>
+          <a:lin ang="5400000" scaled="0"/>
+        </a:gradFill>
+      </a:fillStyleLst>
+      <a:lnStyleLst>
+        <a:ln w="6350" cap="flat" cmpd="sng" algn="ctr">
+          <a:solidFill>
+            <a:schemeClr val="phClr"/>
+          </a:solidFill>
+          <a:prstDash val="solid"/>
+          <a:miter lim="800000"/>
+        </a:ln>
+        <a:ln w="12700" cap="flat" cmpd="sng" algn="ctr">
+          <a:solidFill>
+            <a:schemeClr val="phClr"/>
+          </a:solidFill>
+          <a:prstDash val="solid"/>
+          <a:miter lim="800000"/>
+        </a:ln>
+        <a:ln w="19050" cap="flat" cmpd="sng" algn="ctr">
+          <a:solidFill>
+            <a:schemeClr val="phClr"/>
+          </a:solidFill>
+          <a:prstDash val="solid"/>
+          <a:miter lim="800000"/>
+        </a:ln>
+      </a:lnStyleLst>
+      <a:effectStyleLst>
+        <a:effectStyle>
+          <a:effectLst/>
+        </a:effectStyle>
+        <a:effectStyle>
+          <a:effectLst/>
+        </a:effectStyle>
+        <a:effectStyle>
+          <a:effectLst>
+            <a:outerShdw blurRad="57150" dist="19050" dir="5400000" algn="ctr" rotWithShape="0">
+              <a:srgbClr val="000000">
+                <a:alpha val="63000"/>
+              </a:srgbClr>
+            </a:outerShdw>
+          </a:effectLst>
+        </a:effectStyle>
+      </a:effectStyleLst>
+      <a:bgFillStyleLst>
+        <a:solidFill>
+          <a:schemeClr val="phClr"/>
+        </a:solidFill>
+        <a:solidFill>
+          <a:schemeClr val="phClr">
+            <a:tint val="95000"/>
+            <a:satMod val="170000"/>
+          </a:schemeClr>
+        </a:solidFill>
+        <a:gradFill rotWithShape="1">
+          <a:gsLst>
+            <a:gs pos="0">
+              <a:schemeClr val="phClr">
+                <a:tint val="93000"/>
+                <a:satMod val="150000"/>
+                <a:shade val="98000"/>
+                <a:lumMod val="102000"/>
+              </a:schemeClr>
+            </a:gs>
+            <a:gs pos="50000">
+              <a:schemeClr val="phClr">
+                <a:tint val="98000"/>
+                <a:satMod val="130000"/>
+                <a:shade val="90000"/>
+                <a:lumMod val="103000"/>
+              </a:schemeClr>
+            </a:gs>
+            <a:gs pos="100000">
+              <a:schemeClr val="phClr">
+                <a:shade val="63000"/>
+                <a:satMod val="120000"/>
+              </a:schemeClr>
+            </a:gs>
+          </a:gsLst>
+          <a:lin ang="5400000" scaled="0"/>
+        </a:gradFill>
+      </a:bgFillStyleLst>
+    </a:fmtScheme>
+  </a:themeElements>
+  <a:objectDefaults/>
+  <a:extraClrSchemeLst/>
+  <a:extLst>
+    <a:ext uri="{05A4C25C-085E-4340-85A3-A5531E510DB2}">
+      <thm15:themeFamily xmlns:thm15="http://schemas.microsoft.com/office/thememl/2012/main" name="Office Theme" id="{62F939B6-93AF-4DB8-9C6B-D6C7DFDC589F}" vid="{4A3C46E8-61CC-4603-A589-7422A47A8E4A}"/>
+    </a:ext>
+  </a:extLst>
+</a:theme>
 </file>
</xml_diff>

<commit_message>
Nova mudança na apresentação
</commit_message>
<xml_diff>
--- a/Apresentação_Monografia.pptx
+++ b/Apresentação_Monografia.pptx
@@ -5,7 +5,7 @@
     <p:sldMasterId id="2147483660" r:id="rId1"/>
   </p:sldMasterIdLst>
   <p:notesMasterIdLst>
-    <p:notesMasterId r:id="rId13"/>
+    <p:notesMasterId r:id="rId18"/>
   </p:notesMasterIdLst>
   <p:sldIdLst>
     <p:sldId id="256" r:id="rId2"/>
@@ -15,10 +15,15 @@
     <p:sldId id="260" r:id="rId6"/>
     <p:sldId id="266" r:id="rId7"/>
     <p:sldId id="265" r:id="rId8"/>
-    <p:sldId id="264" r:id="rId9"/>
-    <p:sldId id="262" r:id="rId10"/>
-    <p:sldId id="261" r:id="rId11"/>
-    <p:sldId id="263" r:id="rId12"/>
+    <p:sldId id="268" r:id="rId9"/>
+    <p:sldId id="269" r:id="rId10"/>
+    <p:sldId id="267" r:id="rId11"/>
+    <p:sldId id="270" r:id="rId12"/>
+    <p:sldId id="271" r:id="rId13"/>
+    <p:sldId id="264" r:id="rId14"/>
+    <p:sldId id="262" r:id="rId15"/>
+    <p:sldId id="261" r:id="rId16"/>
+    <p:sldId id="263" r:id="rId17"/>
   </p:sldIdLst>
   <p:sldSz cx="12192000" cy="6858000"/>
   <p:notesSz cx="6858000" cy="9144000"/>
@@ -207,7 +212,7 @@
           <a:p>
             <a:fld id="{B249BB1A-A7AB-4605-BA31-E8B7C8754CB0}" type="datetimeFigureOut">
               <a:rPr lang="pt-BR" smtClean="0"/>
-              <a:t>10/03/2022</a:t>
+              <a:t>21/03/2022</a:t>
             </a:fld>
             <a:endParaRPr lang="pt-BR"/>
           </a:p>
@@ -721,7 +726,7 @@
           <a:p>
             <a:fld id="{60BA69AB-7D77-4AD1-B9DF-F84D0C411437}" type="datetimeFigureOut">
               <a:rPr lang="pt-BR" smtClean="0"/>
-              <a:t>10/03/2022</a:t>
+              <a:t>21/03/2022</a:t>
             </a:fld>
             <a:endParaRPr lang="pt-BR"/>
           </a:p>
@@ -891,7 +896,7 @@
           <a:p>
             <a:fld id="{60BA69AB-7D77-4AD1-B9DF-F84D0C411437}" type="datetimeFigureOut">
               <a:rPr lang="pt-BR" smtClean="0"/>
-              <a:t>10/03/2022</a:t>
+              <a:t>21/03/2022</a:t>
             </a:fld>
             <a:endParaRPr lang="pt-BR"/>
           </a:p>
@@ -1071,7 +1076,7 @@
           <a:p>
             <a:fld id="{60BA69AB-7D77-4AD1-B9DF-F84D0C411437}" type="datetimeFigureOut">
               <a:rPr lang="pt-BR" smtClean="0"/>
-              <a:t>10/03/2022</a:t>
+              <a:t>21/03/2022</a:t>
             </a:fld>
             <a:endParaRPr lang="pt-BR"/>
           </a:p>
@@ -1241,7 +1246,7 @@
           <a:p>
             <a:fld id="{60BA69AB-7D77-4AD1-B9DF-F84D0C411437}" type="datetimeFigureOut">
               <a:rPr lang="pt-BR" smtClean="0"/>
-              <a:t>10/03/2022</a:t>
+              <a:t>21/03/2022</a:t>
             </a:fld>
             <a:endParaRPr lang="pt-BR"/>
           </a:p>
@@ -1509,7 +1514,7 @@
           <a:p>
             <a:fld id="{60BA69AB-7D77-4AD1-B9DF-F84D0C411437}" type="datetimeFigureOut">
               <a:rPr lang="pt-BR" smtClean="0"/>
-              <a:t>10/03/2022</a:t>
+              <a:t>21/03/2022</a:t>
             </a:fld>
             <a:endParaRPr lang="pt-BR"/>
           </a:p>
@@ -1741,7 +1746,7 @@
           <a:p>
             <a:fld id="{60BA69AB-7D77-4AD1-B9DF-F84D0C411437}" type="datetimeFigureOut">
               <a:rPr lang="pt-BR" smtClean="0"/>
-              <a:t>10/03/2022</a:t>
+              <a:t>21/03/2022</a:t>
             </a:fld>
             <a:endParaRPr lang="pt-BR"/>
           </a:p>
@@ -2100,7 +2105,7 @@
           <a:p>
             <a:fld id="{60BA69AB-7D77-4AD1-B9DF-F84D0C411437}" type="datetimeFigureOut">
               <a:rPr lang="pt-BR" smtClean="0"/>
-              <a:t>10/03/2022</a:t>
+              <a:t>21/03/2022</a:t>
             </a:fld>
             <a:endParaRPr lang="pt-BR"/>
           </a:p>
@@ -2241,7 +2246,7 @@
           <a:p>
             <a:fld id="{60BA69AB-7D77-4AD1-B9DF-F84D0C411437}" type="datetimeFigureOut">
               <a:rPr lang="pt-BR" smtClean="0"/>
-              <a:t>10/03/2022</a:t>
+              <a:t>21/03/2022</a:t>
             </a:fld>
             <a:endParaRPr lang="pt-BR"/>
           </a:p>
@@ -2336,7 +2341,7 @@
           <a:p>
             <a:fld id="{60BA69AB-7D77-4AD1-B9DF-F84D0C411437}" type="datetimeFigureOut">
               <a:rPr lang="pt-BR" smtClean="0"/>
-              <a:t>10/03/2022</a:t>
+              <a:t>21/03/2022</a:t>
             </a:fld>
             <a:endParaRPr lang="pt-BR"/>
           </a:p>
@@ -2693,7 +2698,7 @@
           <a:p>
             <a:fld id="{60BA69AB-7D77-4AD1-B9DF-F84D0C411437}" type="datetimeFigureOut">
               <a:rPr lang="pt-BR" smtClean="0"/>
-              <a:t>10/03/2022</a:t>
+              <a:t>21/03/2022</a:t>
             </a:fld>
             <a:endParaRPr lang="pt-BR"/>
           </a:p>
@@ -3050,7 +3055,7 @@
           <a:p>
             <a:fld id="{60BA69AB-7D77-4AD1-B9DF-F84D0C411437}" type="datetimeFigureOut">
               <a:rPr lang="pt-BR" smtClean="0"/>
-              <a:t>10/03/2022</a:t>
+              <a:t>21/03/2022</a:t>
             </a:fld>
             <a:endParaRPr lang="pt-BR"/>
           </a:p>
@@ -3292,7 +3297,7 @@
           <a:p>
             <a:fld id="{60BA69AB-7D77-4AD1-B9DF-F84D0C411437}" type="datetimeFigureOut">
               <a:rPr lang="pt-BR" smtClean="0"/>
-              <a:t>10/03/2022</a:t>
+              <a:t>21/03/2022</a:t>
             </a:fld>
             <a:endParaRPr lang="pt-BR"/>
           </a:p>
@@ -4126,7 +4131,7 @@
           <p:cNvPr id="2" name="Título 1">
             <a:extLst>
               <a:ext uri="{FF2B5EF4-FFF2-40B4-BE49-F238E27FC236}">
-                <a16:creationId xmlns:a16="http://schemas.microsoft.com/office/drawing/2014/main" id="{EE723563-498C-41C1-B3F0-3151A8E3C0D1}"/>
+                <a16:creationId xmlns:a16="http://schemas.microsoft.com/office/drawing/2014/main" id="{00254AF3-D498-404C-B6FD-BEF2A1C729C7}"/>
               </a:ext>
             </a:extLst>
           </p:cNvPr>
@@ -4137,131 +4142,64 @@
             <p:ph type="title"/>
           </p:nvPr>
         </p:nvSpPr>
-        <p:spPr/>
-        <p:txBody>
-          <a:bodyPr/>
-          <a:lstStyle/>
-          <a:p>
-            <a:r>
-              <a:rPr lang="pt-BR" dirty="0"/>
-              <a:t>Trabalhos futuros</a:t>
-            </a:r>
-          </a:p>
-        </p:txBody>
-      </p:sp>
-      <p:sp>
-        <p:nvSpPr>
-          <p:cNvPr id="3" name="Espaço Reservado para Conteúdo 2">
+        <p:spPr>
+          <a:xfrm>
+            <a:off x="2352434" y="96687"/>
+            <a:ext cx="7729728" cy="685384"/>
+          </a:xfrm>
+        </p:spPr>
+        <p:txBody>
+          <a:bodyPr>
+            <a:normAutofit fontScale="90000"/>
+          </a:bodyPr>
+          <a:lstStyle/>
+          <a:p>
+            <a:r>
+              <a:rPr lang="pt-BR" dirty="0"/>
+              <a:t>Modelo do DW</a:t>
+            </a:r>
+          </a:p>
+        </p:txBody>
+      </p:sp>
+      <p:pic>
+        <p:nvPicPr>
+          <p:cNvPr id="7" name="Espaço Reservado para Conteúdo 6" descr="Diagrama, Esquemático&#10;&#10;Descrição gerada automaticamente">
             <a:extLst>
               <a:ext uri="{FF2B5EF4-FFF2-40B4-BE49-F238E27FC236}">
-                <a16:creationId xmlns:a16="http://schemas.microsoft.com/office/drawing/2014/main" id="{8660081E-8ACB-4B7E-BA17-832681C4C0C9}"/>
+                <a16:creationId xmlns:a16="http://schemas.microsoft.com/office/drawing/2014/main" id="{C998D2B8-515C-47AA-88D2-E665F0F64D1B}"/>
               </a:ext>
             </a:extLst>
           </p:cNvPr>
-          <p:cNvSpPr>
-            <a:spLocks noGrp="1"/>
-          </p:cNvSpPr>
+          <p:cNvPicPr>
+            <a:picLocks noGrp="1" noChangeAspect="1"/>
+          </p:cNvPicPr>
           <p:nvPr>
             <p:ph idx="1"/>
           </p:nvPr>
-        </p:nvSpPr>
-        <p:spPr/>
-        <p:txBody>
-          <a:bodyPr>
-            <a:normAutofit fontScale="85000" lnSpcReduction="20000"/>
-          </a:bodyPr>
-          <a:lstStyle/>
-          <a:p>
-            <a:pPr lvl="0">
-              <a:lnSpc>
-                <a:spcPct val="110000"/>
-              </a:lnSpc>
-            </a:pPr>
-            <a:r>
-              <a:rPr lang="pt-BR" dirty="0"/>
-              <a:t>Criar bancos de dados transacional para os anos após 2015 do ENEM e a população desses dados no banco de dados do DW.</a:t>
-            </a:r>
-          </a:p>
-          <a:p>
-            <a:pPr lvl="0">
-              <a:lnSpc>
-                <a:spcPct val="110000"/>
-              </a:lnSpc>
-            </a:pPr>
-            <a:r>
-              <a:rPr lang="pt-BR" dirty="0"/>
-              <a:t>Ampliar a visualização de dados e ampliar os relatórios baseados em novas perguntas que o DW responda.</a:t>
-            </a:r>
-          </a:p>
-          <a:p>
-            <a:pPr lvl="0">
-              <a:lnSpc>
-                <a:spcPct val="110000"/>
-              </a:lnSpc>
-            </a:pPr>
-            <a:r>
-              <a:rPr lang="pt-BR" dirty="0"/>
-              <a:t> Melhorar a capacidade da infraestrutura, principalmente, no armazenamento de dados. </a:t>
-            </a:r>
-          </a:p>
-          <a:p>
-            <a:pPr lvl="0">
-              <a:lnSpc>
-                <a:spcPct val="110000"/>
-              </a:lnSpc>
-            </a:pPr>
-            <a:r>
-              <a:rPr lang="pt-BR" dirty="0"/>
-              <a:t>Refatorar os códigos do ETL tanto do transacional quanto do DW. </a:t>
-            </a:r>
-          </a:p>
-          <a:p>
-            <a:pPr lvl="0">
-              <a:lnSpc>
-                <a:spcPct val="110000"/>
-              </a:lnSpc>
-            </a:pPr>
-            <a:r>
-              <a:rPr lang="pt-BR" dirty="0"/>
-              <a:t>Realizar estudo de heurísticas para melhorar o desempenho das consultas que já existem e geram os relatórios. </a:t>
-            </a:r>
-          </a:p>
-          <a:p>
-            <a:pPr lvl="0">
-              <a:lnSpc>
-                <a:spcPct val="110000"/>
-              </a:lnSpc>
-            </a:pPr>
-            <a:r>
-              <a:rPr lang="pt-BR" dirty="0"/>
-              <a:t>Usar a capacidade dos dados para realizar um estudo com foco em </a:t>
-            </a:r>
-            <a:r>
-              <a:rPr lang="pt-BR" dirty="0" err="1"/>
-              <a:t>Tuning</a:t>
-            </a:r>
-            <a:r>
-              <a:rPr lang="pt-BR" dirty="0"/>
-              <a:t> de banco de dados.</a:t>
-            </a:r>
-          </a:p>
-          <a:p>
-            <a:pPr lvl="0">
-              <a:lnSpc>
-                <a:spcPct val="110000"/>
-              </a:lnSpc>
-            </a:pPr>
-            <a:r>
-              <a:rPr lang="pt-BR" dirty="0"/>
-              <a:t>Adaptar o banco de dados atual de acordo com o LGPD.</a:t>
-            </a:r>
-          </a:p>
-        </p:txBody>
-      </p:sp>
+        </p:nvPicPr>
+        <p:blipFill>
+          <a:blip r:embed="rId2">
+            <a:extLst>
+              <a:ext uri="{28A0092B-C50C-407E-A947-70E740481C1C}">
+                <a14:useLocalDpi xmlns:a14="http://schemas.microsoft.com/office/drawing/2010/main" val="0"/>
+              </a:ext>
+            </a:extLst>
+          </a:blip>
+          <a:stretch>
+            <a:fillRect/>
+          </a:stretch>
+        </p:blipFill>
+        <p:spPr>
+          <a:xfrm>
+            <a:off x="1572768" y="886968"/>
+            <a:ext cx="9098280" cy="5971032"/>
+          </a:xfrm>
+        </p:spPr>
+      </p:pic>
     </p:spTree>
     <p:extLst>
       <p:ext uri="{BB962C8B-B14F-4D97-AF65-F5344CB8AC3E}">
-        <p14:creationId xmlns:p14="http://schemas.microsoft.com/office/powerpoint/2010/main" val="580782446"/>
+        <p14:creationId xmlns:p14="http://schemas.microsoft.com/office/powerpoint/2010/main" val="574228118"/>
       </p:ext>
     </p:extLst>
   </p:cSld>
@@ -4290,10 +4228,10 @@
       </p:grpSpPr>
       <p:sp>
         <p:nvSpPr>
-          <p:cNvPr id="4" name="Título 3">
+          <p:cNvPr id="2" name="Título 1">
             <a:extLst>
               <a:ext uri="{FF2B5EF4-FFF2-40B4-BE49-F238E27FC236}">
-                <a16:creationId xmlns:a16="http://schemas.microsoft.com/office/drawing/2014/main" id="{6E1BA72A-980A-4BB4-8D44-217C7B3A4431}"/>
+                <a16:creationId xmlns:a16="http://schemas.microsoft.com/office/drawing/2014/main" id="{F4CB12D3-4265-43E4-87F2-7433FCCB1AAB}"/>
               </a:ext>
             </a:extLst>
           </p:cNvPr>
@@ -4301,7 +4239,7 @@
             <a:spLocks noGrp="1"/>
           </p:cNvSpPr>
           <p:nvPr>
-            <p:ph type="ctrTitle"/>
+            <p:ph type="title"/>
           </p:nvPr>
         </p:nvSpPr>
         <p:spPr/>
@@ -4311,15 +4249,66 @@
           <a:p>
             <a:r>
               <a:rPr lang="pt-BR" dirty="0"/>
-              <a:t>OBRIgado!!</a:t>
-            </a:r>
+              <a:t>ETL do TRANSACIONAL para o </a:t>
+            </a:r>
+            <a:r>
+              <a:rPr lang="pt-BR" dirty="0" err="1"/>
+              <a:t>dw</a:t>
+            </a:r>
+            <a:endParaRPr lang="pt-BR" dirty="0"/>
+          </a:p>
+        </p:txBody>
+      </p:sp>
+      <p:sp>
+        <p:nvSpPr>
+          <p:cNvPr id="4" name="Espaço Reservado para Conteúdo 3">
+            <a:extLst>
+              <a:ext uri="{FF2B5EF4-FFF2-40B4-BE49-F238E27FC236}">
+                <a16:creationId xmlns:a16="http://schemas.microsoft.com/office/drawing/2014/main" id="{9086E008-917B-4C09-8876-71D158D3EB10}"/>
+              </a:ext>
+            </a:extLst>
+          </p:cNvPr>
+          <p:cNvSpPr>
+            <a:spLocks noGrp="1"/>
+          </p:cNvSpPr>
+          <p:nvPr>
+            <p:ph idx="1"/>
+          </p:nvPr>
+        </p:nvSpPr>
+        <p:spPr/>
+        <p:txBody>
+          <a:bodyPr/>
+          <a:lstStyle/>
+          <a:p>
+            <a:r>
+              <a:rPr lang="pt-BR" dirty="0"/>
+              <a:t>Após os dados estarem disponíveis nos bancos de dados transacionais, então pode ser realizado o ETL do transacional para o DW. </a:t>
+            </a:r>
+          </a:p>
+          <a:p>
+            <a:r>
+              <a:rPr lang="pt-BR" dirty="0"/>
+              <a:t>O ETL extrai os dados do transacional, realiza as devidas transformações e faz o carregamento para o DW. </a:t>
+            </a:r>
+          </a:p>
+          <a:p>
+            <a:r>
+              <a:rPr lang="pt-BR" dirty="0"/>
+              <a:t>Os planos de carga em sua maioria são gerados e executados usando a ferramenta Pentaho Data Integration.</a:t>
+            </a:r>
+          </a:p>
+          <a:p>
+            <a:pPr marL="0" indent="0">
+              <a:buNone/>
+            </a:pPr>
+            <a:endParaRPr lang="pt-BR" dirty="0"/>
           </a:p>
         </p:txBody>
       </p:sp>
     </p:spTree>
     <p:extLst>
       <p:ext uri="{BB962C8B-B14F-4D97-AF65-F5344CB8AC3E}">
-        <p14:creationId xmlns:p14="http://schemas.microsoft.com/office/powerpoint/2010/main" val="2185586797"/>
+        <p14:creationId xmlns:p14="http://schemas.microsoft.com/office/powerpoint/2010/main" val="2011013534"/>
       </p:ext>
     </p:extLst>
   </p:cSld>
@@ -4329,206 +4318,7 @@
 </p:sld>
 </file>
 
-<file path=ppt/slides/slide2.xml><?xml version="1.0" encoding="utf-8"?>
-<p:sld xmlns:a="http://schemas.openxmlformats.org/drawingml/2006/main" xmlns:r="http://schemas.openxmlformats.org/officeDocument/2006/relationships" xmlns:p="http://schemas.openxmlformats.org/presentationml/2006/main">
-  <p:cSld>
-    <p:bg>
-      <p:bgPr>
-        <a:solidFill>
-          <a:schemeClr val="bg1"/>
-        </a:solidFill>
-        <a:effectLst/>
-      </p:bgPr>
-    </p:bg>
-    <p:spTree>
-      <p:nvGrpSpPr>
-        <p:cNvPr id="1" name=""/>
-        <p:cNvGrpSpPr/>
-        <p:nvPr/>
-      </p:nvGrpSpPr>
-      <p:grpSpPr>
-        <a:xfrm>
-          <a:off x="0" y="0"/>
-          <a:ext cx="0" cy="0"/>
-          <a:chOff x="0" y="0"/>
-          <a:chExt cx="0" cy="0"/>
-        </a:xfrm>
-      </p:grpSpPr>
-      <p:sp>
-        <p:nvSpPr>
-          <p:cNvPr id="4" name="Título 3">
-            <a:extLst>
-              <a:ext uri="{FF2B5EF4-FFF2-40B4-BE49-F238E27FC236}">
-                <a16:creationId xmlns:a16="http://schemas.microsoft.com/office/drawing/2014/main" id="{013A5804-A670-482E-AFAC-1C35D1094321}"/>
-              </a:ext>
-            </a:extLst>
-          </p:cNvPr>
-          <p:cNvSpPr>
-            <a:spLocks noGrp="1"/>
-          </p:cNvSpPr>
-          <p:nvPr>
-            <p:ph type="title"/>
-          </p:nvPr>
-        </p:nvSpPr>
-        <p:spPr/>
-        <p:txBody>
-          <a:bodyPr/>
-          <a:lstStyle/>
-          <a:p>
-            <a:r>
-              <a:rPr lang="pt-BR" dirty="0"/>
-              <a:t>Sumário da apresentação</a:t>
-            </a:r>
-          </a:p>
-        </p:txBody>
-      </p:sp>
-      <p:sp>
-        <p:nvSpPr>
-          <p:cNvPr id="5" name="Espaço Reservado para Conteúdo 4">
-            <a:extLst>
-              <a:ext uri="{FF2B5EF4-FFF2-40B4-BE49-F238E27FC236}">
-                <a16:creationId xmlns:a16="http://schemas.microsoft.com/office/drawing/2014/main" id="{E52EF3AD-EF1D-4842-9D25-784B91827396}"/>
-              </a:ext>
-            </a:extLst>
-          </p:cNvPr>
-          <p:cNvSpPr>
-            <a:spLocks noGrp="1"/>
-          </p:cNvSpPr>
-          <p:nvPr>
-            <p:ph sz="half" idx="1"/>
-          </p:nvPr>
-        </p:nvSpPr>
-        <p:spPr>
-          <a:xfrm>
-            <a:off x="1581912" y="2332653"/>
-            <a:ext cx="4271771" cy="3407373"/>
-          </a:xfrm>
-        </p:spPr>
-        <p:txBody>
-          <a:bodyPr>
-            <a:normAutofit fontScale="92500" lnSpcReduction="10000"/>
-          </a:bodyPr>
-          <a:lstStyle/>
-          <a:p>
-            <a:r>
-              <a:rPr lang="pt-BR" dirty="0"/>
-              <a:t>Motivação do trabalho</a:t>
-            </a:r>
-          </a:p>
-          <a:p>
-            <a:r>
-              <a:rPr lang="pt-BR" dirty="0"/>
-              <a:t>O que é o Enem?</a:t>
-            </a:r>
-          </a:p>
-          <a:p>
-            <a:r>
-              <a:rPr lang="pt-BR" dirty="0"/>
-              <a:t>Estrutura do Enem</a:t>
-            </a:r>
-          </a:p>
-          <a:p>
-            <a:r>
-              <a:rPr lang="pt-BR" dirty="0"/>
-              <a:t>Disponibilização dos dados</a:t>
-            </a:r>
-          </a:p>
-          <a:p>
-            <a:r>
-              <a:rPr lang="pt-BR" dirty="0"/>
-              <a:t>Modelo Conceitual</a:t>
-            </a:r>
-          </a:p>
-          <a:p>
-            <a:r>
-              <a:rPr lang="pt-BR" dirty="0"/>
-              <a:t>Modelo Lógico</a:t>
-            </a:r>
-          </a:p>
-          <a:p>
-            <a:r>
-              <a:rPr lang="pt-BR" dirty="0"/>
-              <a:t>ETL do fonte para o transacional</a:t>
-            </a:r>
-          </a:p>
-          <a:p>
-            <a:r>
-              <a:rPr lang="pt-BR" dirty="0"/>
-              <a:t>Modelo do DW</a:t>
-            </a:r>
-          </a:p>
-          <a:p>
-            <a:r>
-              <a:rPr lang="pt-BR" dirty="0"/>
-              <a:t>ETL do transacional para o DW</a:t>
-            </a:r>
-          </a:p>
-          <a:p>
-            <a:endParaRPr lang="pt-BR" dirty="0"/>
-          </a:p>
-        </p:txBody>
-      </p:sp>
-      <p:sp>
-        <p:nvSpPr>
-          <p:cNvPr id="12" name="Espaço Reservado para Conteúdo 11">
-            <a:extLst>
-              <a:ext uri="{FF2B5EF4-FFF2-40B4-BE49-F238E27FC236}">
-                <a16:creationId xmlns:a16="http://schemas.microsoft.com/office/drawing/2014/main" id="{1DC8DC75-F08F-4BB9-B139-994375B64C72}"/>
-              </a:ext>
-            </a:extLst>
-          </p:cNvPr>
-          <p:cNvSpPr>
-            <a:spLocks noGrp="1"/>
-          </p:cNvSpPr>
-          <p:nvPr>
-            <p:ph sz="half" idx="2"/>
-          </p:nvPr>
-        </p:nvSpPr>
-        <p:spPr>
-          <a:xfrm>
-            <a:off x="6338315" y="2332653"/>
-            <a:ext cx="4270247" cy="3407373"/>
-          </a:xfrm>
-        </p:spPr>
-        <p:txBody>
-          <a:bodyPr>
-            <a:normAutofit fontScale="92500" lnSpcReduction="10000"/>
-          </a:bodyPr>
-          <a:lstStyle/>
-          <a:p>
-            <a:r>
-              <a:rPr lang="pt-BR" dirty="0"/>
-              <a:t>Resultados</a:t>
-            </a:r>
-          </a:p>
-          <a:p>
-            <a:r>
-              <a:rPr lang="pt-BR" dirty="0"/>
-              <a:t>Impedimentos</a:t>
-            </a:r>
-          </a:p>
-          <a:p>
-            <a:r>
-              <a:rPr lang="pt-BR" dirty="0"/>
-              <a:t>Trabalhos futuros</a:t>
-            </a:r>
-          </a:p>
-        </p:txBody>
-      </p:sp>
-    </p:spTree>
-    <p:extLst>
-      <p:ext uri="{BB962C8B-B14F-4D97-AF65-F5344CB8AC3E}">
-        <p14:creationId xmlns:p14="http://schemas.microsoft.com/office/powerpoint/2010/main" val="4088120445"/>
-      </p:ext>
-    </p:extLst>
-  </p:cSld>
-  <p:clrMapOvr>
-    <a:masterClrMapping/>
-  </p:clrMapOvr>
-</p:sld>
-</file>
-
-<file path=ppt/slides/slide3.xml><?xml version="1.0" encoding="utf-8"?>
+<file path=ppt/slides/slide12.xml><?xml version="1.0" encoding="utf-8"?>
 <p:sld xmlns:a="http://schemas.openxmlformats.org/drawingml/2006/main" xmlns:r="http://schemas.openxmlformats.org/officeDocument/2006/relationships" xmlns:p="http://schemas.openxmlformats.org/presentationml/2006/main">
   <p:cSld>
     <p:spTree>
@@ -4550,7 +4340,7 @@
           <p:cNvPr id="2" name="Título 1">
             <a:extLst>
               <a:ext uri="{FF2B5EF4-FFF2-40B4-BE49-F238E27FC236}">
-                <a16:creationId xmlns:a16="http://schemas.microsoft.com/office/drawing/2014/main" id="{55B233D2-FBF4-4F78-A628-C204A007F775}"/>
+                <a16:creationId xmlns:a16="http://schemas.microsoft.com/office/drawing/2014/main" id="{F4CB12D3-4265-43E4-87F2-7433FCCB1AAB}"/>
               </a:ext>
             </a:extLst>
           </p:cNvPr>
@@ -4561,65 +4351,61 @@
             <p:ph type="title"/>
           </p:nvPr>
         </p:nvSpPr>
-        <p:spPr/>
+        <p:spPr>
+          <a:xfrm>
+            <a:off x="2231136" y="218243"/>
+            <a:ext cx="7729728" cy="1188720"/>
+          </a:xfrm>
+        </p:spPr>
         <p:txBody>
           <a:bodyPr/>
           <a:lstStyle/>
           <a:p>
             <a:r>
               <a:rPr lang="pt-BR" dirty="0"/>
-              <a:t>Motivação </a:t>
-            </a:r>
-          </a:p>
-        </p:txBody>
-      </p:sp>
-      <p:sp>
-        <p:nvSpPr>
-          <p:cNvPr id="5" name="Espaço Reservado para Conteúdo 4">
+              <a:t>ETL do TRANSACIONAL para o </a:t>
+            </a:r>
+            <a:r>
+              <a:rPr lang="pt-BR" dirty="0" err="1"/>
+              <a:t>dw</a:t>
+            </a:r>
+            <a:endParaRPr lang="pt-BR" dirty="0"/>
+          </a:p>
+        </p:txBody>
+      </p:sp>
+      <p:pic>
+        <p:nvPicPr>
+          <p:cNvPr id="4" name="Espaço Reservado para Conteúdo 3">
             <a:extLst>
               <a:ext uri="{FF2B5EF4-FFF2-40B4-BE49-F238E27FC236}">
-                <a16:creationId xmlns:a16="http://schemas.microsoft.com/office/drawing/2014/main" id="{F7B30167-1EEE-4828-822C-E7977107202F}"/>
+                <a16:creationId xmlns:a16="http://schemas.microsoft.com/office/drawing/2014/main" id="{3D17C2CA-DC54-4B88-B8D3-745136CF89B9}"/>
               </a:ext>
             </a:extLst>
           </p:cNvPr>
-          <p:cNvSpPr>
-            <a:spLocks noGrp="1"/>
-          </p:cNvSpPr>
+          <p:cNvPicPr>
+            <a:picLocks noGrp="1" noChangeAspect="1"/>
+          </p:cNvPicPr>
           <p:nvPr>
             <p:ph idx="1"/>
           </p:nvPr>
-        </p:nvSpPr>
-        <p:spPr/>
-        <p:txBody>
-          <a:bodyPr/>
-          <a:lstStyle/>
-          <a:p>
-            <a:pPr algn="just"/>
-            <a:r>
-              <a:rPr lang="pt-BR" dirty="0"/>
-              <a:t>Através da Lei de Acesso à Informação (LAI) cujo a referência é: Lei nº 12.527/2011. Os dados são disponibilizados e podem ser acessar de forma gratuita.</a:t>
-            </a:r>
-          </a:p>
-          <a:p>
-            <a:pPr algn="just"/>
-            <a:r>
-              <a:rPr lang="pt-BR" dirty="0"/>
-              <a:t>Um dos dados disponibilizados na área da educação são os dados do Enem.</a:t>
-            </a:r>
-          </a:p>
-          <a:p>
-            <a:pPr algn="just"/>
-            <a:r>
-              <a:rPr lang="pt-BR" dirty="0"/>
-              <a:t>A principal motivação deste trabalho é ampliar o conhecimento sobre o Enem utilizando esses dados que são disponibilizados.</a:t>
-            </a:r>
-          </a:p>
-        </p:txBody>
-      </p:sp>
+        </p:nvPicPr>
+        <p:blipFill>
+          <a:blip r:embed="rId2"/>
+          <a:stretch>
+            <a:fillRect/>
+          </a:stretch>
+        </p:blipFill>
+        <p:spPr>
+          <a:xfrm>
+            <a:off x="827316" y="1567478"/>
+            <a:ext cx="10686660" cy="4422776"/>
+          </a:xfrm>
+        </p:spPr>
+      </p:pic>
     </p:spTree>
     <p:extLst>
       <p:ext uri="{BB962C8B-B14F-4D97-AF65-F5344CB8AC3E}">
-        <p14:creationId xmlns:p14="http://schemas.microsoft.com/office/powerpoint/2010/main" val="1652980792"/>
+        <p14:creationId xmlns:p14="http://schemas.microsoft.com/office/powerpoint/2010/main" val="2117636349"/>
       </p:ext>
     </p:extLst>
   </p:cSld>
@@ -4629,451 +4415,7 @@
 </p:sld>
 </file>
 
-<file path=ppt/slides/slide4.xml><?xml version="1.0" encoding="utf-8"?>
-<p:sld xmlns:a="http://schemas.openxmlformats.org/drawingml/2006/main" xmlns:r="http://schemas.openxmlformats.org/officeDocument/2006/relationships" xmlns:p="http://schemas.openxmlformats.org/presentationml/2006/main">
-  <p:cSld>
-    <p:spTree>
-      <p:nvGrpSpPr>
-        <p:cNvPr id="1" name=""/>
-        <p:cNvGrpSpPr/>
-        <p:nvPr/>
-      </p:nvGrpSpPr>
-      <p:grpSpPr>
-        <a:xfrm>
-          <a:off x="0" y="0"/>
-          <a:ext cx="0" cy="0"/>
-          <a:chOff x="0" y="0"/>
-          <a:chExt cx="0" cy="0"/>
-        </a:xfrm>
-      </p:grpSpPr>
-      <p:sp>
-        <p:nvSpPr>
-          <p:cNvPr id="2" name="Título 1">
-            <a:extLst>
-              <a:ext uri="{FF2B5EF4-FFF2-40B4-BE49-F238E27FC236}">
-                <a16:creationId xmlns:a16="http://schemas.microsoft.com/office/drawing/2014/main" id="{6C8A5F95-9E09-4BE4-A2EB-CB3408597B08}"/>
-              </a:ext>
-            </a:extLst>
-          </p:cNvPr>
-          <p:cNvSpPr>
-            <a:spLocks noGrp="1"/>
-          </p:cNvSpPr>
-          <p:nvPr>
-            <p:ph type="title"/>
-          </p:nvPr>
-        </p:nvSpPr>
-        <p:spPr/>
-        <p:txBody>
-          <a:bodyPr/>
-          <a:lstStyle/>
-          <a:p>
-            <a:r>
-              <a:rPr lang="pt-BR" dirty="0"/>
-              <a:t>Objetivo</a:t>
-            </a:r>
-          </a:p>
-        </p:txBody>
-      </p:sp>
-      <p:sp>
-        <p:nvSpPr>
-          <p:cNvPr id="3" name="Espaço Reservado para Conteúdo 2">
-            <a:extLst>
-              <a:ext uri="{FF2B5EF4-FFF2-40B4-BE49-F238E27FC236}">
-                <a16:creationId xmlns:a16="http://schemas.microsoft.com/office/drawing/2014/main" id="{48245E10-2B3E-4ADC-A72D-44E4C2A9B7A4}"/>
-              </a:ext>
-            </a:extLst>
-          </p:cNvPr>
-          <p:cNvSpPr>
-            <a:spLocks noGrp="1"/>
-          </p:cNvSpPr>
-          <p:nvPr>
-            <p:ph idx="1"/>
-          </p:nvPr>
-        </p:nvSpPr>
-        <p:spPr/>
-        <p:txBody>
-          <a:bodyPr/>
-          <a:lstStyle/>
-          <a:p>
-            <a:pPr algn="just"/>
-            <a:r>
-              <a:rPr lang="pt-BR" dirty="0"/>
-              <a:t>Disponibilizar os dados em banco de dados a ser estudado. </a:t>
-            </a:r>
-          </a:p>
-          <a:p>
-            <a:pPr algn="just"/>
-            <a:r>
-              <a:rPr lang="pt-BR" dirty="0"/>
-              <a:t>Criar banco de dados transacional contém os dados normalizados a cada ano. </a:t>
-            </a:r>
-          </a:p>
-          <a:p>
-            <a:pPr algn="just"/>
-            <a:r>
-              <a:rPr lang="pt-BR" dirty="0"/>
-              <a:t>Criar um DW contém os dados históricos.</a:t>
-            </a:r>
-          </a:p>
-          <a:p>
-            <a:pPr algn="just"/>
-            <a:r>
-              <a:rPr lang="pt-BR" dirty="0"/>
-              <a:t>Criar as </a:t>
-            </a:r>
-            <a:r>
-              <a:rPr lang="pt-BR" dirty="0" err="1"/>
-              <a:t>ETL’s</a:t>
-            </a:r>
-            <a:r>
-              <a:rPr lang="pt-BR" dirty="0"/>
-              <a:t> tanto para o transacional quanto para o DW.</a:t>
-            </a:r>
-          </a:p>
-          <a:p>
-            <a:pPr algn="just"/>
-            <a:r>
-              <a:rPr lang="pt-BR" dirty="0"/>
-              <a:t>Criar os gráficos no PowerBi para a visualização de dados.</a:t>
-            </a:r>
-          </a:p>
-        </p:txBody>
-      </p:sp>
-    </p:spTree>
-    <p:extLst>
-      <p:ext uri="{BB962C8B-B14F-4D97-AF65-F5344CB8AC3E}">
-        <p14:creationId xmlns:p14="http://schemas.microsoft.com/office/powerpoint/2010/main" val="3980846735"/>
-      </p:ext>
-    </p:extLst>
-  </p:cSld>
-  <p:clrMapOvr>
-    <a:masterClrMapping/>
-  </p:clrMapOvr>
-</p:sld>
-</file>
-
-<file path=ppt/slides/slide5.xml><?xml version="1.0" encoding="utf-8"?>
-<p:sld xmlns:a="http://schemas.openxmlformats.org/drawingml/2006/main" xmlns:r="http://schemas.openxmlformats.org/officeDocument/2006/relationships" xmlns:p="http://schemas.openxmlformats.org/presentationml/2006/main">
-  <p:cSld>
-    <p:spTree>
-      <p:nvGrpSpPr>
-        <p:cNvPr id="1" name=""/>
-        <p:cNvGrpSpPr/>
-        <p:nvPr/>
-      </p:nvGrpSpPr>
-      <p:grpSpPr>
-        <a:xfrm>
-          <a:off x="0" y="0"/>
-          <a:ext cx="0" cy="0"/>
-          <a:chOff x="0" y="0"/>
-          <a:chExt cx="0" cy="0"/>
-        </a:xfrm>
-      </p:grpSpPr>
-      <p:sp>
-        <p:nvSpPr>
-          <p:cNvPr id="2" name="Título 1">
-            <a:extLst>
-              <a:ext uri="{FF2B5EF4-FFF2-40B4-BE49-F238E27FC236}">
-                <a16:creationId xmlns:a16="http://schemas.microsoft.com/office/drawing/2014/main" id="{CB3FFAE1-D83D-4A35-BEA7-A04966D75E69}"/>
-              </a:ext>
-            </a:extLst>
-          </p:cNvPr>
-          <p:cNvSpPr>
-            <a:spLocks noGrp="1"/>
-          </p:cNvSpPr>
-          <p:nvPr>
-            <p:ph type="title"/>
-          </p:nvPr>
-        </p:nvSpPr>
-        <p:spPr/>
-        <p:txBody>
-          <a:bodyPr/>
-          <a:lstStyle/>
-          <a:p>
-            <a:r>
-              <a:rPr lang="pt-BR" dirty="0"/>
-              <a:t>O que é o </a:t>
-            </a:r>
-            <a:r>
-              <a:rPr lang="pt-BR" dirty="0" err="1"/>
-              <a:t>enem</a:t>
-            </a:r>
-            <a:r>
-              <a:rPr lang="pt-BR" dirty="0"/>
-              <a:t>?</a:t>
-            </a:r>
-          </a:p>
-        </p:txBody>
-      </p:sp>
-      <p:sp>
-        <p:nvSpPr>
-          <p:cNvPr id="3" name="Espaço Reservado para Conteúdo 2">
-            <a:extLst>
-              <a:ext uri="{FF2B5EF4-FFF2-40B4-BE49-F238E27FC236}">
-                <a16:creationId xmlns:a16="http://schemas.microsoft.com/office/drawing/2014/main" id="{CF3F8C7A-EC56-4447-AACF-498405F209E7}"/>
-              </a:ext>
-            </a:extLst>
-          </p:cNvPr>
-          <p:cNvSpPr>
-            <a:spLocks noGrp="1"/>
-          </p:cNvSpPr>
-          <p:nvPr>
-            <p:ph idx="1"/>
-          </p:nvPr>
-        </p:nvSpPr>
-        <p:spPr>
-          <a:xfrm>
-            <a:off x="2231136" y="2359152"/>
-            <a:ext cx="7729728" cy="3380875"/>
-          </a:xfrm>
-        </p:spPr>
-        <p:txBody>
-          <a:bodyPr/>
-          <a:lstStyle/>
-          <a:p>
-            <a:pPr algn="just"/>
-            <a:r>
-              <a:rPr lang="pt-BR" dirty="0"/>
-              <a:t>Exame Nacional de Ensino Médio que tem por objetivo avaliar a qualidade do Ensino Médio Brasileiro. </a:t>
-            </a:r>
-          </a:p>
-          <a:p>
-            <a:pPr algn="just"/>
-            <a:r>
-              <a:rPr lang="pt-BR" dirty="0"/>
-              <a:t>As provas são divididas em: Ciência da Natureza, Ciência Humanas, Linguagens e Códigos (com a Redação).</a:t>
-            </a:r>
-          </a:p>
-          <a:p>
-            <a:r>
-              <a:rPr lang="pt-BR" dirty="0"/>
-              <a:t>O exame contém ao total 180 questões objetivas e uma prova discursa.</a:t>
-            </a:r>
-          </a:p>
-          <a:p>
-            <a:r>
-              <a:rPr lang="pt-BR" dirty="0"/>
-              <a:t>As provas são dividas em cores como: amarela, azul, branca e rosa, porém as cores podem mudar de acordo com o ano.</a:t>
-            </a:r>
-          </a:p>
-        </p:txBody>
-      </p:sp>
-    </p:spTree>
-    <p:extLst>
-      <p:ext uri="{BB962C8B-B14F-4D97-AF65-F5344CB8AC3E}">
-        <p14:creationId xmlns:p14="http://schemas.microsoft.com/office/powerpoint/2010/main" val="1380718363"/>
-      </p:ext>
-    </p:extLst>
-  </p:cSld>
-  <p:clrMapOvr>
-    <a:masterClrMapping/>
-  </p:clrMapOvr>
-</p:sld>
-</file>
-
-<file path=ppt/slides/slide6.xml><?xml version="1.0" encoding="utf-8"?>
-<p:sld xmlns:a="http://schemas.openxmlformats.org/drawingml/2006/main" xmlns:r="http://schemas.openxmlformats.org/officeDocument/2006/relationships" xmlns:p="http://schemas.openxmlformats.org/presentationml/2006/main">
-  <p:cSld>
-    <p:spTree>
-      <p:nvGrpSpPr>
-        <p:cNvPr id="1" name=""/>
-        <p:cNvGrpSpPr/>
-        <p:nvPr/>
-      </p:nvGrpSpPr>
-      <p:grpSpPr>
-        <a:xfrm>
-          <a:off x="0" y="0"/>
-          <a:ext cx="0" cy="0"/>
-          <a:chOff x="0" y="0"/>
-          <a:chExt cx="0" cy="0"/>
-        </a:xfrm>
-      </p:grpSpPr>
-      <p:sp>
-        <p:nvSpPr>
-          <p:cNvPr id="2" name="Título 1">
-            <a:extLst>
-              <a:ext uri="{FF2B5EF4-FFF2-40B4-BE49-F238E27FC236}">
-                <a16:creationId xmlns:a16="http://schemas.microsoft.com/office/drawing/2014/main" id="{27A9E124-2A85-4DCA-B085-C790C652574B}"/>
-              </a:ext>
-            </a:extLst>
-          </p:cNvPr>
-          <p:cNvSpPr>
-            <a:spLocks noGrp="1"/>
-          </p:cNvSpPr>
-          <p:nvPr>
-            <p:ph type="title"/>
-          </p:nvPr>
-        </p:nvSpPr>
-        <p:spPr>
-          <a:xfrm>
-            <a:off x="2417749" y="1"/>
-            <a:ext cx="7729728" cy="578498"/>
-          </a:xfrm>
-        </p:spPr>
-        <p:txBody>
-          <a:bodyPr>
-            <a:normAutofit fontScale="90000"/>
-          </a:bodyPr>
-          <a:lstStyle/>
-          <a:p>
-            <a:r>
-              <a:rPr lang="pt-BR" dirty="0"/>
-              <a:t>MODELO CONCEITUAL</a:t>
-            </a:r>
-          </a:p>
-        </p:txBody>
-      </p:sp>
-      <p:pic>
-        <p:nvPicPr>
-          <p:cNvPr id="4" name="Imagem 3" descr="Diagrama, Esquemático&#10;&#10;Descrição gerada automaticamente">
-            <a:extLst>
-              <a:ext uri="{FF2B5EF4-FFF2-40B4-BE49-F238E27FC236}">
-                <a16:creationId xmlns:a16="http://schemas.microsoft.com/office/drawing/2014/main" id="{0723FB66-1A7E-46FA-AE76-CB81EB8A287E}"/>
-              </a:ext>
-            </a:extLst>
-          </p:cNvPr>
-          <p:cNvPicPr>
-            <a:picLocks noChangeAspect="1"/>
-          </p:cNvPicPr>
-          <p:nvPr/>
-        </p:nvPicPr>
-        <p:blipFill>
-          <a:blip r:embed="rId2">
-            <a:extLst>
-              <a:ext uri="{28A0092B-C50C-407E-A947-70E740481C1C}">
-                <a14:useLocalDpi xmlns:a14="http://schemas.microsoft.com/office/drawing/2010/main" val="0"/>
-              </a:ext>
-            </a:extLst>
-          </a:blip>
-          <a:stretch>
-            <a:fillRect/>
-          </a:stretch>
-        </p:blipFill>
-        <p:spPr>
-          <a:xfrm>
-            <a:off x="0" y="662474"/>
-            <a:ext cx="12192000" cy="6195526"/>
-          </a:xfrm>
-          <a:prstGeom prst="rect">
-            <a:avLst/>
-          </a:prstGeom>
-        </p:spPr>
-      </p:pic>
-    </p:spTree>
-    <p:extLst>
-      <p:ext uri="{BB962C8B-B14F-4D97-AF65-F5344CB8AC3E}">
-        <p14:creationId xmlns:p14="http://schemas.microsoft.com/office/powerpoint/2010/main" val="2125985074"/>
-      </p:ext>
-    </p:extLst>
-  </p:cSld>
-  <p:clrMapOvr>
-    <a:masterClrMapping/>
-  </p:clrMapOvr>
-</p:sld>
-</file>
-
-<file path=ppt/slides/slide7.xml><?xml version="1.0" encoding="utf-8"?>
-<p:sld xmlns:a="http://schemas.openxmlformats.org/drawingml/2006/main" xmlns:r="http://schemas.openxmlformats.org/officeDocument/2006/relationships" xmlns:p="http://schemas.openxmlformats.org/presentationml/2006/main">
-  <p:cSld>
-    <p:spTree>
-      <p:nvGrpSpPr>
-        <p:cNvPr id="1" name=""/>
-        <p:cNvGrpSpPr/>
-        <p:nvPr/>
-      </p:nvGrpSpPr>
-      <p:grpSpPr>
-        <a:xfrm>
-          <a:off x="0" y="0"/>
-          <a:ext cx="0" cy="0"/>
-          <a:chOff x="0" y="0"/>
-          <a:chExt cx="0" cy="0"/>
-        </a:xfrm>
-      </p:grpSpPr>
-      <p:sp>
-        <p:nvSpPr>
-          <p:cNvPr id="2" name="Título 1">
-            <a:extLst>
-              <a:ext uri="{FF2B5EF4-FFF2-40B4-BE49-F238E27FC236}">
-                <a16:creationId xmlns:a16="http://schemas.microsoft.com/office/drawing/2014/main" id="{DEA205FE-3801-415D-B3CF-AC68802183C2}"/>
-              </a:ext>
-            </a:extLst>
-          </p:cNvPr>
-          <p:cNvSpPr>
-            <a:spLocks noGrp="1"/>
-          </p:cNvSpPr>
-          <p:nvPr>
-            <p:ph type="title"/>
-          </p:nvPr>
-        </p:nvSpPr>
-        <p:spPr>
-          <a:xfrm>
-            <a:off x="2231135" y="65315"/>
-            <a:ext cx="7729728" cy="569168"/>
-          </a:xfrm>
-        </p:spPr>
-        <p:txBody>
-          <a:bodyPr>
-            <a:normAutofit fontScale="90000"/>
-          </a:bodyPr>
-          <a:lstStyle/>
-          <a:p>
-            <a:r>
-              <a:rPr lang="pt-BR" dirty="0"/>
-              <a:t>MODELO lógico</a:t>
-            </a:r>
-          </a:p>
-        </p:txBody>
-      </p:sp>
-      <p:pic>
-        <p:nvPicPr>
-          <p:cNvPr id="5" name="Imagem 4" descr="Diagrama&#10;&#10;Descrição gerada automaticamente">
-            <a:extLst>
-              <a:ext uri="{FF2B5EF4-FFF2-40B4-BE49-F238E27FC236}">
-                <a16:creationId xmlns:a16="http://schemas.microsoft.com/office/drawing/2014/main" id="{762F17E1-BEE4-4F33-BE89-A17CD547582A}"/>
-              </a:ext>
-            </a:extLst>
-          </p:cNvPr>
-          <p:cNvPicPr>
-            <a:picLocks noChangeAspect="1"/>
-          </p:cNvPicPr>
-          <p:nvPr/>
-        </p:nvPicPr>
-        <p:blipFill>
-          <a:blip r:embed="rId3">
-            <a:extLst>
-              <a:ext uri="{28A0092B-C50C-407E-A947-70E740481C1C}">
-                <a14:useLocalDpi xmlns:a14="http://schemas.microsoft.com/office/drawing/2010/main" val="0"/>
-              </a:ext>
-            </a:extLst>
-          </a:blip>
-          <a:stretch>
-            <a:fillRect/>
-          </a:stretch>
-        </p:blipFill>
-        <p:spPr>
-          <a:xfrm>
-            <a:off x="1" y="718457"/>
-            <a:ext cx="12192000" cy="6074229"/>
-          </a:xfrm>
-          <a:prstGeom prst="rect">
-            <a:avLst/>
-          </a:prstGeom>
-        </p:spPr>
-      </p:pic>
-    </p:spTree>
-    <p:extLst>
-      <p:ext uri="{BB962C8B-B14F-4D97-AF65-F5344CB8AC3E}">
-        <p14:creationId xmlns:p14="http://schemas.microsoft.com/office/powerpoint/2010/main" val="2348554424"/>
-      </p:ext>
-    </p:extLst>
-  </p:cSld>
-  <p:clrMapOvr>
-    <a:masterClrMapping/>
-  </p:clrMapOvr>
-</p:sld>
-</file>
-
-<file path=ppt/slides/slide8.xml><?xml version="1.0" encoding="utf-8"?>
+<file path=ppt/slides/slide13.xml><?xml version="1.0" encoding="utf-8"?>
 <p:sld xmlns:a="http://schemas.openxmlformats.org/drawingml/2006/main" xmlns:r="http://schemas.openxmlformats.org/officeDocument/2006/relationships" xmlns:p="http://schemas.openxmlformats.org/presentationml/2006/main">
   <p:cSld>
     <p:spTree>
@@ -5353,6 +4695,1218 @@
 </p:sld>
 </file>
 
+<file path=ppt/slides/slide14.xml><?xml version="1.0" encoding="utf-8"?>
+<p:sld xmlns:a="http://schemas.openxmlformats.org/drawingml/2006/main" xmlns:r="http://schemas.openxmlformats.org/officeDocument/2006/relationships" xmlns:p="http://schemas.openxmlformats.org/presentationml/2006/main">
+  <p:cSld>
+    <p:spTree>
+      <p:nvGrpSpPr>
+        <p:cNvPr id="1" name=""/>
+        <p:cNvGrpSpPr/>
+        <p:nvPr/>
+      </p:nvGrpSpPr>
+      <p:grpSpPr>
+        <a:xfrm>
+          <a:off x="0" y="0"/>
+          <a:ext cx="0" cy="0"/>
+          <a:chOff x="0" y="0"/>
+          <a:chExt cx="0" cy="0"/>
+        </a:xfrm>
+      </p:grpSpPr>
+      <p:sp>
+        <p:nvSpPr>
+          <p:cNvPr id="2" name="Título 1">
+            <a:extLst>
+              <a:ext uri="{FF2B5EF4-FFF2-40B4-BE49-F238E27FC236}">
+                <a16:creationId xmlns:a16="http://schemas.microsoft.com/office/drawing/2014/main" id="{46A95C4D-FEDB-4D6F-9A85-8D656F0138B4}"/>
+              </a:ext>
+            </a:extLst>
+          </p:cNvPr>
+          <p:cNvSpPr>
+            <a:spLocks noGrp="1"/>
+          </p:cNvSpPr>
+          <p:nvPr>
+            <p:ph type="title"/>
+          </p:nvPr>
+        </p:nvSpPr>
+        <p:spPr/>
+        <p:txBody>
+          <a:bodyPr/>
+          <a:lstStyle/>
+          <a:p>
+            <a:r>
+              <a:rPr lang="pt-BR" dirty="0"/>
+              <a:t>Limitações</a:t>
+            </a:r>
+          </a:p>
+        </p:txBody>
+      </p:sp>
+      <p:sp>
+        <p:nvSpPr>
+          <p:cNvPr id="3" name="Espaço Reservado para Conteúdo 2">
+            <a:extLst>
+              <a:ext uri="{FF2B5EF4-FFF2-40B4-BE49-F238E27FC236}">
+                <a16:creationId xmlns:a16="http://schemas.microsoft.com/office/drawing/2014/main" id="{73190E5A-FB2B-41E3-8959-40D8E8B89DC5}"/>
+              </a:ext>
+            </a:extLst>
+          </p:cNvPr>
+          <p:cNvSpPr>
+            <a:spLocks noGrp="1"/>
+          </p:cNvSpPr>
+          <p:nvPr>
+            <p:ph idx="1"/>
+          </p:nvPr>
+        </p:nvSpPr>
+        <p:spPr/>
+        <p:txBody>
+          <a:bodyPr/>
+          <a:lstStyle/>
+          <a:p>
+            <a:r>
+              <a:rPr lang="pt-BR" dirty="0"/>
+              <a:t>Padronização dos dados.</a:t>
+            </a:r>
+          </a:p>
+          <a:p>
+            <a:r>
+              <a:rPr lang="pt-BR" dirty="0"/>
+              <a:t>Criação da infraestrutura.</a:t>
+            </a:r>
+          </a:p>
+          <a:p>
+            <a:r>
+              <a:rPr lang="pt-BR" dirty="0"/>
+              <a:t>Armazenamento dos dados.</a:t>
+            </a:r>
+          </a:p>
+          <a:p>
+            <a:r>
+              <a:rPr lang="pt-BR" dirty="0"/>
+              <a:t>Capacidade de processamento dos dados.</a:t>
+            </a:r>
+          </a:p>
+        </p:txBody>
+      </p:sp>
+    </p:spTree>
+    <p:extLst>
+      <p:ext uri="{BB962C8B-B14F-4D97-AF65-F5344CB8AC3E}">
+        <p14:creationId xmlns:p14="http://schemas.microsoft.com/office/powerpoint/2010/main" val="493301709"/>
+      </p:ext>
+    </p:extLst>
+  </p:cSld>
+  <p:clrMapOvr>
+    <a:masterClrMapping/>
+  </p:clrMapOvr>
+</p:sld>
+</file>
+
+<file path=ppt/slides/slide15.xml><?xml version="1.0" encoding="utf-8"?>
+<p:sld xmlns:a="http://schemas.openxmlformats.org/drawingml/2006/main" xmlns:r="http://schemas.openxmlformats.org/officeDocument/2006/relationships" xmlns:p="http://schemas.openxmlformats.org/presentationml/2006/main">
+  <p:cSld>
+    <p:spTree>
+      <p:nvGrpSpPr>
+        <p:cNvPr id="1" name=""/>
+        <p:cNvGrpSpPr/>
+        <p:nvPr/>
+      </p:nvGrpSpPr>
+      <p:grpSpPr>
+        <a:xfrm>
+          <a:off x="0" y="0"/>
+          <a:ext cx="0" cy="0"/>
+          <a:chOff x="0" y="0"/>
+          <a:chExt cx="0" cy="0"/>
+        </a:xfrm>
+      </p:grpSpPr>
+      <p:sp>
+        <p:nvSpPr>
+          <p:cNvPr id="2" name="Título 1">
+            <a:extLst>
+              <a:ext uri="{FF2B5EF4-FFF2-40B4-BE49-F238E27FC236}">
+                <a16:creationId xmlns:a16="http://schemas.microsoft.com/office/drawing/2014/main" id="{EE723563-498C-41C1-B3F0-3151A8E3C0D1}"/>
+              </a:ext>
+            </a:extLst>
+          </p:cNvPr>
+          <p:cNvSpPr>
+            <a:spLocks noGrp="1"/>
+          </p:cNvSpPr>
+          <p:nvPr>
+            <p:ph type="title"/>
+          </p:nvPr>
+        </p:nvSpPr>
+        <p:spPr/>
+        <p:txBody>
+          <a:bodyPr/>
+          <a:lstStyle/>
+          <a:p>
+            <a:r>
+              <a:rPr lang="pt-BR" dirty="0"/>
+              <a:t>Trabalhos futuros</a:t>
+            </a:r>
+          </a:p>
+        </p:txBody>
+      </p:sp>
+      <p:sp>
+        <p:nvSpPr>
+          <p:cNvPr id="3" name="Espaço Reservado para Conteúdo 2">
+            <a:extLst>
+              <a:ext uri="{FF2B5EF4-FFF2-40B4-BE49-F238E27FC236}">
+                <a16:creationId xmlns:a16="http://schemas.microsoft.com/office/drawing/2014/main" id="{8660081E-8ACB-4B7E-BA17-832681C4C0C9}"/>
+              </a:ext>
+            </a:extLst>
+          </p:cNvPr>
+          <p:cNvSpPr>
+            <a:spLocks noGrp="1"/>
+          </p:cNvSpPr>
+          <p:nvPr>
+            <p:ph idx="1"/>
+          </p:nvPr>
+        </p:nvSpPr>
+        <p:spPr/>
+        <p:txBody>
+          <a:bodyPr>
+            <a:normAutofit fontScale="85000" lnSpcReduction="20000"/>
+          </a:bodyPr>
+          <a:lstStyle/>
+          <a:p>
+            <a:pPr lvl="0">
+              <a:lnSpc>
+                <a:spcPct val="110000"/>
+              </a:lnSpc>
+            </a:pPr>
+            <a:r>
+              <a:rPr lang="pt-BR" dirty="0"/>
+              <a:t>Criar bancos de dados transacional para os anos após 2015 do ENEM e a população desses dados no banco de dados do DW.</a:t>
+            </a:r>
+          </a:p>
+          <a:p>
+            <a:pPr lvl="0">
+              <a:lnSpc>
+                <a:spcPct val="110000"/>
+              </a:lnSpc>
+            </a:pPr>
+            <a:r>
+              <a:rPr lang="pt-BR" dirty="0"/>
+              <a:t>Ampliar a visualização de dados e ampliar os relatórios baseados em novas perguntas que o DW responda.</a:t>
+            </a:r>
+          </a:p>
+          <a:p>
+            <a:pPr lvl="0">
+              <a:lnSpc>
+                <a:spcPct val="110000"/>
+              </a:lnSpc>
+            </a:pPr>
+            <a:r>
+              <a:rPr lang="pt-BR" dirty="0"/>
+              <a:t> Melhorar a capacidade da infraestrutura, principalmente, no armazenamento de dados. </a:t>
+            </a:r>
+          </a:p>
+          <a:p>
+            <a:pPr lvl="0">
+              <a:lnSpc>
+                <a:spcPct val="110000"/>
+              </a:lnSpc>
+            </a:pPr>
+            <a:r>
+              <a:rPr lang="pt-BR" dirty="0"/>
+              <a:t>Refatorar os códigos do ETL tanto do transacional quanto do DW. </a:t>
+            </a:r>
+          </a:p>
+          <a:p>
+            <a:pPr lvl="0">
+              <a:lnSpc>
+                <a:spcPct val="110000"/>
+              </a:lnSpc>
+            </a:pPr>
+            <a:r>
+              <a:rPr lang="pt-BR" dirty="0"/>
+              <a:t>Realizar estudo de heurísticas para melhorar o desempenho das consultas que já existem e geram os relatórios. </a:t>
+            </a:r>
+          </a:p>
+          <a:p>
+            <a:pPr lvl="0">
+              <a:lnSpc>
+                <a:spcPct val="110000"/>
+              </a:lnSpc>
+            </a:pPr>
+            <a:r>
+              <a:rPr lang="pt-BR" dirty="0"/>
+              <a:t>Usar a capacidade dos dados para realizar um estudo com foco em </a:t>
+            </a:r>
+            <a:r>
+              <a:rPr lang="pt-BR" dirty="0" err="1"/>
+              <a:t>Tuning</a:t>
+            </a:r>
+            <a:r>
+              <a:rPr lang="pt-BR" dirty="0"/>
+              <a:t> de banco de dados.</a:t>
+            </a:r>
+          </a:p>
+          <a:p>
+            <a:pPr lvl="0">
+              <a:lnSpc>
+                <a:spcPct val="110000"/>
+              </a:lnSpc>
+            </a:pPr>
+            <a:r>
+              <a:rPr lang="pt-BR" dirty="0"/>
+              <a:t>Adaptar o banco de dados atual de acordo com o LGPD.</a:t>
+            </a:r>
+          </a:p>
+        </p:txBody>
+      </p:sp>
+    </p:spTree>
+    <p:extLst>
+      <p:ext uri="{BB962C8B-B14F-4D97-AF65-F5344CB8AC3E}">
+        <p14:creationId xmlns:p14="http://schemas.microsoft.com/office/powerpoint/2010/main" val="580782446"/>
+      </p:ext>
+    </p:extLst>
+  </p:cSld>
+  <p:clrMapOvr>
+    <a:masterClrMapping/>
+  </p:clrMapOvr>
+</p:sld>
+</file>
+
+<file path=ppt/slides/slide16.xml><?xml version="1.0" encoding="utf-8"?>
+<p:sld xmlns:a="http://schemas.openxmlformats.org/drawingml/2006/main" xmlns:r="http://schemas.openxmlformats.org/officeDocument/2006/relationships" xmlns:p="http://schemas.openxmlformats.org/presentationml/2006/main">
+  <p:cSld>
+    <p:spTree>
+      <p:nvGrpSpPr>
+        <p:cNvPr id="1" name=""/>
+        <p:cNvGrpSpPr/>
+        <p:nvPr/>
+      </p:nvGrpSpPr>
+      <p:grpSpPr>
+        <a:xfrm>
+          <a:off x="0" y="0"/>
+          <a:ext cx="0" cy="0"/>
+          <a:chOff x="0" y="0"/>
+          <a:chExt cx="0" cy="0"/>
+        </a:xfrm>
+      </p:grpSpPr>
+      <p:sp>
+        <p:nvSpPr>
+          <p:cNvPr id="4" name="Título 3">
+            <a:extLst>
+              <a:ext uri="{FF2B5EF4-FFF2-40B4-BE49-F238E27FC236}">
+                <a16:creationId xmlns:a16="http://schemas.microsoft.com/office/drawing/2014/main" id="{6E1BA72A-980A-4BB4-8D44-217C7B3A4431}"/>
+              </a:ext>
+            </a:extLst>
+          </p:cNvPr>
+          <p:cNvSpPr>
+            <a:spLocks noGrp="1"/>
+          </p:cNvSpPr>
+          <p:nvPr>
+            <p:ph type="ctrTitle"/>
+          </p:nvPr>
+        </p:nvSpPr>
+        <p:spPr/>
+        <p:txBody>
+          <a:bodyPr/>
+          <a:lstStyle/>
+          <a:p>
+            <a:r>
+              <a:rPr lang="pt-BR" dirty="0"/>
+              <a:t>OBRIgado!!</a:t>
+            </a:r>
+          </a:p>
+        </p:txBody>
+      </p:sp>
+    </p:spTree>
+    <p:extLst>
+      <p:ext uri="{BB962C8B-B14F-4D97-AF65-F5344CB8AC3E}">
+        <p14:creationId xmlns:p14="http://schemas.microsoft.com/office/powerpoint/2010/main" val="2185586797"/>
+      </p:ext>
+    </p:extLst>
+  </p:cSld>
+  <p:clrMapOvr>
+    <a:masterClrMapping/>
+  </p:clrMapOvr>
+</p:sld>
+</file>
+
+<file path=ppt/slides/slide2.xml><?xml version="1.0" encoding="utf-8"?>
+<p:sld xmlns:a="http://schemas.openxmlformats.org/drawingml/2006/main" xmlns:r="http://schemas.openxmlformats.org/officeDocument/2006/relationships" xmlns:p="http://schemas.openxmlformats.org/presentationml/2006/main">
+  <p:cSld>
+    <p:bg>
+      <p:bgPr>
+        <a:solidFill>
+          <a:schemeClr val="bg1"/>
+        </a:solidFill>
+        <a:effectLst/>
+      </p:bgPr>
+    </p:bg>
+    <p:spTree>
+      <p:nvGrpSpPr>
+        <p:cNvPr id="1" name=""/>
+        <p:cNvGrpSpPr/>
+        <p:nvPr/>
+      </p:nvGrpSpPr>
+      <p:grpSpPr>
+        <a:xfrm>
+          <a:off x="0" y="0"/>
+          <a:ext cx="0" cy="0"/>
+          <a:chOff x="0" y="0"/>
+          <a:chExt cx="0" cy="0"/>
+        </a:xfrm>
+      </p:grpSpPr>
+      <p:sp>
+        <p:nvSpPr>
+          <p:cNvPr id="4" name="Título 3">
+            <a:extLst>
+              <a:ext uri="{FF2B5EF4-FFF2-40B4-BE49-F238E27FC236}">
+                <a16:creationId xmlns:a16="http://schemas.microsoft.com/office/drawing/2014/main" id="{013A5804-A670-482E-AFAC-1C35D1094321}"/>
+              </a:ext>
+            </a:extLst>
+          </p:cNvPr>
+          <p:cNvSpPr>
+            <a:spLocks noGrp="1"/>
+          </p:cNvSpPr>
+          <p:nvPr>
+            <p:ph type="title"/>
+          </p:nvPr>
+        </p:nvSpPr>
+        <p:spPr/>
+        <p:txBody>
+          <a:bodyPr/>
+          <a:lstStyle/>
+          <a:p>
+            <a:r>
+              <a:rPr lang="pt-BR" dirty="0"/>
+              <a:t>Sumário da apresentação</a:t>
+            </a:r>
+          </a:p>
+        </p:txBody>
+      </p:sp>
+      <p:sp>
+        <p:nvSpPr>
+          <p:cNvPr id="5" name="Espaço Reservado para Conteúdo 4">
+            <a:extLst>
+              <a:ext uri="{FF2B5EF4-FFF2-40B4-BE49-F238E27FC236}">
+                <a16:creationId xmlns:a16="http://schemas.microsoft.com/office/drawing/2014/main" id="{E52EF3AD-EF1D-4842-9D25-784B91827396}"/>
+              </a:ext>
+            </a:extLst>
+          </p:cNvPr>
+          <p:cNvSpPr>
+            <a:spLocks noGrp="1"/>
+          </p:cNvSpPr>
+          <p:nvPr>
+            <p:ph sz="half" idx="1"/>
+          </p:nvPr>
+        </p:nvSpPr>
+        <p:spPr>
+          <a:xfrm>
+            <a:off x="1581912" y="2332653"/>
+            <a:ext cx="4271771" cy="3407373"/>
+          </a:xfrm>
+        </p:spPr>
+        <p:txBody>
+          <a:bodyPr>
+            <a:normAutofit fontScale="92500" lnSpcReduction="10000"/>
+          </a:bodyPr>
+          <a:lstStyle/>
+          <a:p>
+            <a:r>
+              <a:rPr lang="pt-BR" dirty="0"/>
+              <a:t>Motivação do trabalho</a:t>
+            </a:r>
+          </a:p>
+          <a:p>
+            <a:r>
+              <a:rPr lang="pt-BR" dirty="0"/>
+              <a:t>O que é o Enem?</a:t>
+            </a:r>
+          </a:p>
+          <a:p>
+            <a:r>
+              <a:rPr lang="pt-BR" dirty="0"/>
+              <a:t>Estrutura do Enem</a:t>
+            </a:r>
+          </a:p>
+          <a:p>
+            <a:r>
+              <a:rPr lang="pt-BR" dirty="0"/>
+              <a:t>Disponibilização dos dados</a:t>
+            </a:r>
+          </a:p>
+          <a:p>
+            <a:r>
+              <a:rPr lang="pt-BR" dirty="0"/>
+              <a:t>Modelo Conceitual</a:t>
+            </a:r>
+          </a:p>
+          <a:p>
+            <a:r>
+              <a:rPr lang="pt-BR" dirty="0"/>
+              <a:t>Modelo Lógico</a:t>
+            </a:r>
+          </a:p>
+          <a:p>
+            <a:r>
+              <a:rPr lang="pt-BR" dirty="0"/>
+              <a:t>ETL do fonte para o transacional</a:t>
+            </a:r>
+          </a:p>
+          <a:p>
+            <a:r>
+              <a:rPr lang="pt-BR" dirty="0"/>
+              <a:t>Modelo do DW</a:t>
+            </a:r>
+          </a:p>
+          <a:p>
+            <a:r>
+              <a:rPr lang="pt-BR" dirty="0"/>
+              <a:t>ETL do transacional para o DW</a:t>
+            </a:r>
+          </a:p>
+          <a:p>
+            <a:endParaRPr lang="pt-BR" dirty="0"/>
+          </a:p>
+        </p:txBody>
+      </p:sp>
+      <p:sp>
+        <p:nvSpPr>
+          <p:cNvPr id="12" name="Espaço Reservado para Conteúdo 11">
+            <a:extLst>
+              <a:ext uri="{FF2B5EF4-FFF2-40B4-BE49-F238E27FC236}">
+                <a16:creationId xmlns:a16="http://schemas.microsoft.com/office/drawing/2014/main" id="{1DC8DC75-F08F-4BB9-B139-994375B64C72}"/>
+              </a:ext>
+            </a:extLst>
+          </p:cNvPr>
+          <p:cNvSpPr>
+            <a:spLocks noGrp="1"/>
+          </p:cNvSpPr>
+          <p:nvPr>
+            <p:ph sz="half" idx="2"/>
+          </p:nvPr>
+        </p:nvSpPr>
+        <p:spPr>
+          <a:xfrm>
+            <a:off x="6338315" y="2332653"/>
+            <a:ext cx="4270247" cy="3407373"/>
+          </a:xfrm>
+        </p:spPr>
+        <p:txBody>
+          <a:bodyPr>
+            <a:normAutofit fontScale="92500" lnSpcReduction="10000"/>
+          </a:bodyPr>
+          <a:lstStyle/>
+          <a:p>
+            <a:r>
+              <a:rPr lang="pt-BR" dirty="0"/>
+              <a:t>Resultados</a:t>
+            </a:r>
+          </a:p>
+          <a:p>
+            <a:r>
+              <a:rPr lang="pt-BR" dirty="0"/>
+              <a:t>Impedimentos</a:t>
+            </a:r>
+          </a:p>
+          <a:p>
+            <a:r>
+              <a:rPr lang="pt-BR" dirty="0"/>
+              <a:t>Trabalhos futuros</a:t>
+            </a:r>
+          </a:p>
+        </p:txBody>
+      </p:sp>
+    </p:spTree>
+    <p:extLst>
+      <p:ext uri="{BB962C8B-B14F-4D97-AF65-F5344CB8AC3E}">
+        <p14:creationId xmlns:p14="http://schemas.microsoft.com/office/powerpoint/2010/main" val="4088120445"/>
+      </p:ext>
+    </p:extLst>
+  </p:cSld>
+  <p:clrMapOvr>
+    <a:masterClrMapping/>
+  </p:clrMapOvr>
+</p:sld>
+</file>
+
+<file path=ppt/slides/slide3.xml><?xml version="1.0" encoding="utf-8"?>
+<p:sld xmlns:a="http://schemas.openxmlformats.org/drawingml/2006/main" xmlns:r="http://schemas.openxmlformats.org/officeDocument/2006/relationships" xmlns:p="http://schemas.openxmlformats.org/presentationml/2006/main">
+  <p:cSld>
+    <p:spTree>
+      <p:nvGrpSpPr>
+        <p:cNvPr id="1" name=""/>
+        <p:cNvGrpSpPr/>
+        <p:nvPr/>
+      </p:nvGrpSpPr>
+      <p:grpSpPr>
+        <a:xfrm>
+          <a:off x="0" y="0"/>
+          <a:ext cx="0" cy="0"/>
+          <a:chOff x="0" y="0"/>
+          <a:chExt cx="0" cy="0"/>
+        </a:xfrm>
+      </p:grpSpPr>
+      <p:sp>
+        <p:nvSpPr>
+          <p:cNvPr id="2" name="Título 1">
+            <a:extLst>
+              <a:ext uri="{FF2B5EF4-FFF2-40B4-BE49-F238E27FC236}">
+                <a16:creationId xmlns:a16="http://schemas.microsoft.com/office/drawing/2014/main" id="{55B233D2-FBF4-4F78-A628-C204A007F775}"/>
+              </a:ext>
+            </a:extLst>
+          </p:cNvPr>
+          <p:cNvSpPr>
+            <a:spLocks noGrp="1"/>
+          </p:cNvSpPr>
+          <p:nvPr>
+            <p:ph type="title"/>
+          </p:nvPr>
+        </p:nvSpPr>
+        <p:spPr/>
+        <p:txBody>
+          <a:bodyPr/>
+          <a:lstStyle/>
+          <a:p>
+            <a:r>
+              <a:rPr lang="pt-BR" dirty="0"/>
+              <a:t>Motivação </a:t>
+            </a:r>
+          </a:p>
+        </p:txBody>
+      </p:sp>
+      <p:sp>
+        <p:nvSpPr>
+          <p:cNvPr id="5" name="Espaço Reservado para Conteúdo 4">
+            <a:extLst>
+              <a:ext uri="{FF2B5EF4-FFF2-40B4-BE49-F238E27FC236}">
+                <a16:creationId xmlns:a16="http://schemas.microsoft.com/office/drawing/2014/main" id="{F7B30167-1EEE-4828-822C-E7977107202F}"/>
+              </a:ext>
+            </a:extLst>
+          </p:cNvPr>
+          <p:cNvSpPr>
+            <a:spLocks noGrp="1"/>
+          </p:cNvSpPr>
+          <p:nvPr>
+            <p:ph idx="1"/>
+          </p:nvPr>
+        </p:nvSpPr>
+        <p:spPr/>
+        <p:txBody>
+          <a:bodyPr/>
+          <a:lstStyle/>
+          <a:p>
+            <a:pPr algn="just"/>
+            <a:r>
+              <a:rPr lang="pt-BR" dirty="0"/>
+              <a:t>Através da Lei de Acesso à Informação (LAI) cujo a referência é: Lei nº 12.527/2011. Os dados são disponibilizados e podem ser acessar de forma gratuita.</a:t>
+            </a:r>
+          </a:p>
+          <a:p>
+            <a:pPr algn="just"/>
+            <a:r>
+              <a:rPr lang="pt-BR" dirty="0"/>
+              <a:t>Um dos dados disponibilizados na área da educação são os dados do Enem.</a:t>
+            </a:r>
+          </a:p>
+          <a:p>
+            <a:pPr algn="just"/>
+            <a:r>
+              <a:rPr lang="pt-BR" dirty="0"/>
+              <a:t>A principal motivação deste trabalho é ampliar o conhecimento sobre o Enem utilizando esses dados que são disponibilizados.</a:t>
+            </a:r>
+          </a:p>
+        </p:txBody>
+      </p:sp>
+    </p:spTree>
+    <p:extLst>
+      <p:ext uri="{BB962C8B-B14F-4D97-AF65-F5344CB8AC3E}">
+        <p14:creationId xmlns:p14="http://schemas.microsoft.com/office/powerpoint/2010/main" val="1652980792"/>
+      </p:ext>
+    </p:extLst>
+  </p:cSld>
+  <p:clrMapOvr>
+    <a:masterClrMapping/>
+  </p:clrMapOvr>
+</p:sld>
+</file>
+
+<file path=ppt/slides/slide4.xml><?xml version="1.0" encoding="utf-8"?>
+<p:sld xmlns:a="http://schemas.openxmlformats.org/drawingml/2006/main" xmlns:r="http://schemas.openxmlformats.org/officeDocument/2006/relationships" xmlns:p="http://schemas.openxmlformats.org/presentationml/2006/main">
+  <p:cSld>
+    <p:spTree>
+      <p:nvGrpSpPr>
+        <p:cNvPr id="1" name=""/>
+        <p:cNvGrpSpPr/>
+        <p:nvPr/>
+      </p:nvGrpSpPr>
+      <p:grpSpPr>
+        <a:xfrm>
+          <a:off x="0" y="0"/>
+          <a:ext cx="0" cy="0"/>
+          <a:chOff x="0" y="0"/>
+          <a:chExt cx="0" cy="0"/>
+        </a:xfrm>
+      </p:grpSpPr>
+      <p:sp>
+        <p:nvSpPr>
+          <p:cNvPr id="2" name="Título 1">
+            <a:extLst>
+              <a:ext uri="{FF2B5EF4-FFF2-40B4-BE49-F238E27FC236}">
+                <a16:creationId xmlns:a16="http://schemas.microsoft.com/office/drawing/2014/main" id="{6C8A5F95-9E09-4BE4-A2EB-CB3408597B08}"/>
+              </a:ext>
+            </a:extLst>
+          </p:cNvPr>
+          <p:cNvSpPr>
+            <a:spLocks noGrp="1"/>
+          </p:cNvSpPr>
+          <p:nvPr>
+            <p:ph type="title"/>
+          </p:nvPr>
+        </p:nvSpPr>
+        <p:spPr/>
+        <p:txBody>
+          <a:bodyPr/>
+          <a:lstStyle/>
+          <a:p>
+            <a:r>
+              <a:rPr lang="pt-BR" dirty="0"/>
+              <a:t>Objetivo</a:t>
+            </a:r>
+          </a:p>
+        </p:txBody>
+      </p:sp>
+      <p:sp>
+        <p:nvSpPr>
+          <p:cNvPr id="3" name="Espaço Reservado para Conteúdo 2">
+            <a:extLst>
+              <a:ext uri="{FF2B5EF4-FFF2-40B4-BE49-F238E27FC236}">
+                <a16:creationId xmlns:a16="http://schemas.microsoft.com/office/drawing/2014/main" id="{48245E10-2B3E-4ADC-A72D-44E4C2A9B7A4}"/>
+              </a:ext>
+            </a:extLst>
+          </p:cNvPr>
+          <p:cNvSpPr>
+            <a:spLocks noGrp="1"/>
+          </p:cNvSpPr>
+          <p:nvPr>
+            <p:ph idx="1"/>
+          </p:nvPr>
+        </p:nvSpPr>
+        <p:spPr/>
+        <p:txBody>
+          <a:bodyPr/>
+          <a:lstStyle/>
+          <a:p>
+            <a:pPr algn="just"/>
+            <a:r>
+              <a:rPr lang="pt-BR" dirty="0"/>
+              <a:t>Disponibilizar os dados em banco de dados a ser estudado. </a:t>
+            </a:r>
+          </a:p>
+          <a:p>
+            <a:pPr algn="just"/>
+            <a:r>
+              <a:rPr lang="pt-BR" dirty="0"/>
+              <a:t>Criar banco de dados transacional contém os dados normalizados a cada ano. </a:t>
+            </a:r>
+          </a:p>
+          <a:p>
+            <a:pPr algn="just"/>
+            <a:r>
+              <a:rPr lang="pt-BR" dirty="0"/>
+              <a:t>Criar um DW contém os dados históricos.</a:t>
+            </a:r>
+          </a:p>
+          <a:p>
+            <a:pPr algn="just"/>
+            <a:r>
+              <a:rPr lang="pt-BR" dirty="0"/>
+              <a:t>Criar as </a:t>
+            </a:r>
+            <a:r>
+              <a:rPr lang="pt-BR" dirty="0" err="1"/>
+              <a:t>ETL’s</a:t>
+            </a:r>
+            <a:r>
+              <a:rPr lang="pt-BR" dirty="0"/>
+              <a:t> tanto para o transacional quanto para o DW.</a:t>
+            </a:r>
+          </a:p>
+          <a:p>
+            <a:pPr algn="just"/>
+            <a:r>
+              <a:rPr lang="pt-BR" dirty="0"/>
+              <a:t>Criar os gráficos no PowerBi para a visualização de dados.</a:t>
+            </a:r>
+          </a:p>
+        </p:txBody>
+      </p:sp>
+    </p:spTree>
+    <p:extLst>
+      <p:ext uri="{BB962C8B-B14F-4D97-AF65-F5344CB8AC3E}">
+        <p14:creationId xmlns:p14="http://schemas.microsoft.com/office/powerpoint/2010/main" val="3980846735"/>
+      </p:ext>
+    </p:extLst>
+  </p:cSld>
+  <p:clrMapOvr>
+    <a:masterClrMapping/>
+  </p:clrMapOvr>
+</p:sld>
+</file>
+
+<file path=ppt/slides/slide5.xml><?xml version="1.0" encoding="utf-8"?>
+<p:sld xmlns:a="http://schemas.openxmlformats.org/drawingml/2006/main" xmlns:r="http://schemas.openxmlformats.org/officeDocument/2006/relationships" xmlns:p="http://schemas.openxmlformats.org/presentationml/2006/main">
+  <p:cSld>
+    <p:bg>
+      <p:bgPr>
+        <a:solidFill>
+          <a:schemeClr val="bg1">
+            <a:lumMod val="95000"/>
+          </a:schemeClr>
+        </a:solidFill>
+        <a:effectLst/>
+      </p:bgPr>
+    </p:bg>
+    <p:spTree>
+      <p:nvGrpSpPr>
+        <p:cNvPr id="1" name=""/>
+        <p:cNvGrpSpPr/>
+        <p:nvPr/>
+      </p:nvGrpSpPr>
+      <p:grpSpPr>
+        <a:xfrm>
+          <a:off x="0" y="0"/>
+          <a:ext cx="0" cy="0"/>
+          <a:chOff x="0" y="0"/>
+          <a:chExt cx="0" cy="0"/>
+        </a:xfrm>
+      </p:grpSpPr>
+      <p:sp>
+        <p:nvSpPr>
+          <p:cNvPr id="2" name="Título 1">
+            <a:extLst>
+              <a:ext uri="{FF2B5EF4-FFF2-40B4-BE49-F238E27FC236}">
+                <a16:creationId xmlns:a16="http://schemas.microsoft.com/office/drawing/2014/main" id="{CB3FFAE1-D83D-4A35-BEA7-A04966D75E69}"/>
+              </a:ext>
+            </a:extLst>
+          </p:cNvPr>
+          <p:cNvSpPr>
+            <a:spLocks noGrp="1"/>
+          </p:cNvSpPr>
+          <p:nvPr>
+            <p:ph type="title"/>
+          </p:nvPr>
+        </p:nvSpPr>
+        <p:spPr/>
+        <p:txBody>
+          <a:bodyPr/>
+          <a:lstStyle/>
+          <a:p>
+            <a:r>
+              <a:rPr lang="pt-BR" dirty="0"/>
+              <a:t>O que é o </a:t>
+            </a:r>
+            <a:r>
+              <a:rPr lang="pt-BR" dirty="0" err="1"/>
+              <a:t>enem</a:t>
+            </a:r>
+            <a:r>
+              <a:rPr lang="pt-BR" dirty="0"/>
+              <a:t>?</a:t>
+            </a:r>
+          </a:p>
+        </p:txBody>
+      </p:sp>
+      <p:sp>
+        <p:nvSpPr>
+          <p:cNvPr id="3" name="Espaço Reservado para Conteúdo 2">
+            <a:extLst>
+              <a:ext uri="{FF2B5EF4-FFF2-40B4-BE49-F238E27FC236}">
+                <a16:creationId xmlns:a16="http://schemas.microsoft.com/office/drawing/2014/main" id="{CF3F8C7A-EC56-4447-AACF-498405F209E7}"/>
+              </a:ext>
+            </a:extLst>
+          </p:cNvPr>
+          <p:cNvSpPr>
+            <a:spLocks noGrp="1"/>
+          </p:cNvSpPr>
+          <p:nvPr>
+            <p:ph idx="1"/>
+          </p:nvPr>
+        </p:nvSpPr>
+        <p:spPr>
+          <a:xfrm>
+            <a:off x="2231136" y="2359152"/>
+            <a:ext cx="7729728" cy="3380875"/>
+          </a:xfrm>
+        </p:spPr>
+        <p:txBody>
+          <a:bodyPr/>
+          <a:lstStyle/>
+          <a:p>
+            <a:pPr algn="just"/>
+            <a:r>
+              <a:rPr lang="pt-BR" dirty="0"/>
+              <a:t>Exame Nacional de Ensino Médio que tem por objetivo avaliar a qualidade do Ensino Médio Brasileiro. </a:t>
+            </a:r>
+          </a:p>
+          <a:p>
+            <a:pPr algn="just"/>
+            <a:r>
+              <a:rPr lang="pt-BR" dirty="0"/>
+              <a:t>As provas são divididas em: Ciência da Natureza, Ciência Humanas, Linguagens e Códigos (com a Redação).</a:t>
+            </a:r>
+          </a:p>
+          <a:p>
+            <a:r>
+              <a:rPr lang="pt-BR" dirty="0"/>
+              <a:t>O exame contém ao total 180 questões objetivas e uma prova discursa.</a:t>
+            </a:r>
+          </a:p>
+          <a:p>
+            <a:r>
+              <a:rPr lang="pt-BR" dirty="0"/>
+              <a:t>As provas são dividas em cores como: amarela, azul, branca e rosa, porém as cores podem mudar de acordo com o ano.</a:t>
+            </a:r>
+          </a:p>
+        </p:txBody>
+      </p:sp>
+    </p:spTree>
+    <p:extLst>
+      <p:ext uri="{BB962C8B-B14F-4D97-AF65-F5344CB8AC3E}">
+        <p14:creationId xmlns:p14="http://schemas.microsoft.com/office/powerpoint/2010/main" val="1380718363"/>
+      </p:ext>
+    </p:extLst>
+  </p:cSld>
+  <p:clrMapOvr>
+    <a:overrideClrMapping bg1="lt1" tx1="dk1" bg2="lt2" tx2="dk2" accent1="accent1" accent2="accent2" accent3="accent3" accent4="accent4" accent5="accent5" accent6="accent6" hlink="hlink" folHlink="folHlink"/>
+  </p:clrMapOvr>
+</p:sld>
+</file>
+
+<file path=ppt/slides/slide6.xml><?xml version="1.0" encoding="utf-8"?>
+<p:sld xmlns:a="http://schemas.openxmlformats.org/drawingml/2006/main" xmlns:r="http://schemas.openxmlformats.org/officeDocument/2006/relationships" xmlns:p="http://schemas.openxmlformats.org/presentationml/2006/main">
+  <p:cSld>
+    <p:spTree>
+      <p:nvGrpSpPr>
+        <p:cNvPr id="1" name=""/>
+        <p:cNvGrpSpPr/>
+        <p:nvPr/>
+      </p:nvGrpSpPr>
+      <p:grpSpPr>
+        <a:xfrm>
+          <a:off x="0" y="0"/>
+          <a:ext cx="0" cy="0"/>
+          <a:chOff x="0" y="0"/>
+          <a:chExt cx="0" cy="0"/>
+        </a:xfrm>
+      </p:grpSpPr>
+      <p:sp>
+        <p:nvSpPr>
+          <p:cNvPr id="2" name="Título 1">
+            <a:extLst>
+              <a:ext uri="{FF2B5EF4-FFF2-40B4-BE49-F238E27FC236}">
+                <a16:creationId xmlns:a16="http://schemas.microsoft.com/office/drawing/2014/main" id="{27A9E124-2A85-4DCA-B085-C790C652574B}"/>
+              </a:ext>
+            </a:extLst>
+          </p:cNvPr>
+          <p:cNvSpPr>
+            <a:spLocks noGrp="1"/>
+          </p:cNvSpPr>
+          <p:nvPr>
+            <p:ph type="title"/>
+          </p:nvPr>
+        </p:nvSpPr>
+        <p:spPr>
+          <a:xfrm>
+            <a:off x="2417749" y="1"/>
+            <a:ext cx="7729728" cy="578498"/>
+          </a:xfrm>
+        </p:spPr>
+        <p:txBody>
+          <a:bodyPr>
+            <a:normAutofit fontScale="90000"/>
+          </a:bodyPr>
+          <a:lstStyle/>
+          <a:p>
+            <a:r>
+              <a:rPr lang="pt-BR" dirty="0"/>
+              <a:t>MODELO CONCEITUAL</a:t>
+            </a:r>
+          </a:p>
+        </p:txBody>
+      </p:sp>
+      <p:pic>
+        <p:nvPicPr>
+          <p:cNvPr id="4" name="Imagem 3" descr="Diagrama, Esquemático&#10;&#10;Descrição gerada automaticamente">
+            <a:extLst>
+              <a:ext uri="{FF2B5EF4-FFF2-40B4-BE49-F238E27FC236}">
+                <a16:creationId xmlns:a16="http://schemas.microsoft.com/office/drawing/2014/main" id="{0723FB66-1A7E-46FA-AE76-CB81EB8A287E}"/>
+              </a:ext>
+            </a:extLst>
+          </p:cNvPr>
+          <p:cNvPicPr>
+            <a:picLocks noChangeAspect="1"/>
+          </p:cNvPicPr>
+          <p:nvPr/>
+        </p:nvPicPr>
+        <p:blipFill>
+          <a:blip r:embed="rId2">
+            <a:extLst>
+              <a:ext uri="{28A0092B-C50C-407E-A947-70E740481C1C}">
+                <a14:useLocalDpi xmlns:a14="http://schemas.microsoft.com/office/drawing/2010/main" val="0"/>
+              </a:ext>
+            </a:extLst>
+          </a:blip>
+          <a:stretch>
+            <a:fillRect/>
+          </a:stretch>
+        </p:blipFill>
+        <p:spPr>
+          <a:xfrm>
+            <a:off x="0" y="662474"/>
+            <a:ext cx="12192000" cy="6195526"/>
+          </a:xfrm>
+          <a:prstGeom prst="rect">
+            <a:avLst/>
+          </a:prstGeom>
+        </p:spPr>
+      </p:pic>
+    </p:spTree>
+    <p:extLst>
+      <p:ext uri="{BB962C8B-B14F-4D97-AF65-F5344CB8AC3E}">
+        <p14:creationId xmlns:p14="http://schemas.microsoft.com/office/powerpoint/2010/main" val="2125985074"/>
+      </p:ext>
+    </p:extLst>
+  </p:cSld>
+  <p:clrMapOvr>
+    <a:masterClrMapping/>
+  </p:clrMapOvr>
+</p:sld>
+</file>
+
+<file path=ppt/slides/slide7.xml><?xml version="1.0" encoding="utf-8"?>
+<p:sld xmlns:a="http://schemas.openxmlformats.org/drawingml/2006/main" xmlns:r="http://schemas.openxmlformats.org/officeDocument/2006/relationships" xmlns:p="http://schemas.openxmlformats.org/presentationml/2006/main">
+  <p:cSld>
+    <p:spTree>
+      <p:nvGrpSpPr>
+        <p:cNvPr id="1" name=""/>
+        <p:cNvGrpSpPr/>
+        <p:nvPr/>
+      </p:nvGrpSpPr>
+      <p:grpSpPr>
+        <a:xfrm>
+          <a:off x="0" y="0"/>
+          <a:ext cx="0" cy="0"/>
+          <a:chOff x="0" y="0"/>
+          <a:chExt cx="0" cy="0"/>
+        </a:xfrm>
+      </p:grpSpPr>
+      <p:sp>
+        <p:nvSpPr>
+          <p:cNvPr id="2" name="Título 1">
+            <a:extLst>
+              <a:ext uri="{FF2B5EF4-FFF2-40B4-BE49-F238E27FC236}">
+                <a16:creationId xmlns:a16="http://schemas.microsoft.com/office/drawing/2014/main" id="{DEA205FE-3801-415D-B3CF-AC68802183C2}"/>
+              </a:ext>
+            </a:extLst>
+          </p:cNvPr>
+          <p:cNvSpPr>
+            <a:spLocks noGrp="1"/>
+          </p:cNvSpPr>
+          <p:nvPr>
+            <p:ph type="title"/>
+          </p:nvPr>
+        </p:nvSpPr>
+        <p:spPr>
+          <a:xfrm>
+            <a:off x="2231135" y="65315"/>
+            <a:ext cx="7729728" cy="569168"/>
+          </a:xfrm>
+        </p:spPr>
+        <p:txBody>
+          <a:bodyPr>
+            <a:normAutofit fontScale="90000"/>
+          </a:bodyPr>
+          <a:lstStyle/>
+          <a:p>
+            <a:r>
+              <a:rPr lang="pt-BR" dirty="0"/>
+              <a:t>MODELO lógico</a:t>
+            </a:r>
+          </a:p>
+        </p:txBody>
+      </p:sp>
+      <p:pic>
+        <p:nvPicPr>
+          <p:cNvPr id="5" name="Imagem 4" descr="Diagrama&#10;&#10;Descrição gerada automaticamente">
+            <a:extLst>
+              <a:ext uri="{FF2B5EF4-FFF2-40B4-BE49-F238E27FC236}">
+                <a16:creationId xmlns:a16="http://schemas.microsoft.com/office/drawing/2014/main" id="{762F17E1-BEE4-4F33-BE89-A17CD547582A}"/>
+              </a:ext>
+            </a:extLst>
+          </p:cNvPr>
+          <p:cNvPicPr>
+            <a:picLocks noChangeAspect="1"/>
+          </p:cNvPicPr>
+          <p:nvPr/>
+        </p:nvPicPr>
+        <p:blipFill>
+          <a:blip r:embed="rId3">
+            <a:extLst>
+              <a:ext uri="{28A0092B-C50C-407E-A947-70E740481C1C}">
+                <a14:useLocalDpi xmlns:a14="http://schemas.microsoft.com/office/drawing/2010/main" val="0"/>
+              </a:ext>
+            </a:extLst>
+          </a:blip>
+          <a:stretch>
+            <a:fillRect/>
+          </a:stretch>
+        </p:blipFill>
+        <p:spPr>
+          <a:xfrm>
+            <a:off x="1" y="718457"/>
+            <a:ext cx="12192000" cy="6074229"/>
+          </a:xfrm>
+          <a:prstGeom prst="rect">
+            <a:avLst/>
+          </a:prstGeom>
+        </p:spPr>
+      </p:pic>
+    </p:spTree>
+    <p:extLst>
+      <p:ext uri="{BB962C8B-B14F-4D97-AF65-F5344CB8AC3E}">
+        <p14:creationId xmlns:p14="http://schemas.microsoft.com/office/powerpoint/2010/main" val="2348554424"/>
+      </p:ext>
+    </p:extLst>
+  </p:cSld>
+  <p:clrMapOvr>
+    <a:masterClrMapping/>
+  </p:clrMapOvr>
+</p:sld>
+</file>
+
+<file path=ppt/slides/slide8.xml><?xml version="1.0" encoding="utf-8"?>
+<p:sld xmlns:a="http://schemas.openxmlformats.org/drawingml/2006/main" xmlns:r="http://schemas.openxmlformats.org/officeDocument/2006/relationships" xmlns:p="http://schemas.openxmlformats.org/presentationml/2006/main">
+  <p:cSld>
+    <p:spTree>
+      <p:nvGrpSpPr>
+        <p:cNvPr id="1" name=""/>
+        <p:cNvGrpSpPr/>
+        <p:nvPr/>
+      </p:nvGrpSpPr>
+      <p:grpSpPr>
+        <a:xfrm>
+          <a:off x="0" y="0"/>
+          <a:ext cx="0" cy="0"/>
+          <a:chOff x="0" y="0"/>
+          <a:chExt cx="0" cy="0"/>
+        </a:xfrm>
+      </p:grpSpPr>
+      <p:sp>
+        <p:nvSpPr>
+          <p:cNvPr id="2" name="Título 1">
+            <a:extLst>
+              <a:ext uri="{FF2B5EF4-FFF2-40B4-BE49-F238E27FC236}">
+                <a16:creationId xmlns:a16="http://schemas.microsoft.com/office/drawing/2014/main" id="{F4CB12D3-4265-43E4-87F2-7433FCCB1AAB}"/>
+              </a:ext>
+            </a:extLst>
+          </p:cNvPr>
+          <p:cNvSpPr>
+            <a:spLocks noGrp="1"/>
+          </p:cNvSpPr>
+          <p:nvPr>
+            <p:ph type="title"/>
+          </p:nvPr>
+        </p:nvSpPr>
+        <p:spPr>
+          <a:xfrm>
+            <a:off x="1024128" y="713231"/>
+            <a:ext cx="9784080" cy="1072253"/>
+          </a:xfrm>
+        </p:spPr>
+        <p:txBody>
+          <a:bodyPr/>
+          <a:lstStyle/>
+          <a:p>
+            <a:r>
+              <a:rPr lang="pt-BR" dirty="0"/>
+              <a:t>ETL DOS DADOS FONTES PARA O TRANSACIONAL</a:t>
+            </a:r>
+          </a:p>
+        </p:txBody>
+      </p:sp>
+      <p:sp>
+        <p:nvSpPr>
+          <p:cNvPr id="3" name="Espaço Reservado para Conteúdo 2">
+            <a:extLst>
+              <a:ext uri="{FF2B5EF4-FFF2-40B4-BE49-F238E27FC236}">
+                <a16:creationId xmlns:a16="http://schemas.microsoft.com/office/drawing/2014/main" id="{DF23D007-5DCE-40EE-BFB6-38330CB2CAB0}"/>
+              </a:ext>
+            </a:extLst>
+          </p:cNvPr>
+          <p:cNvSpPr>
+            <a:spLocks noGrp="1"/>
+          </p:cNvSpPr>
+          <p:nvPr>
+            <p:ph idx="1"/>
+          </p:nvPr>
+        </p:nvSpPr>
+        <p:spPr>
+          <a:xfrm>
+            <a:off x="1874520" y="2052828"/>
+            <a:ext cx="8247888" cy="3101983"/>
+          </a:xfrm>
+        </p:spPr>
+        <p:txBody>
+          <a:bodyPr/>
+          <a:lstStyle/>
+          <a:p>
+            <a:pPr lvl="0" algn="just"/>
+            <a:r>
+              <a:rPr lang="pt-BR" dirty="0"/>
+              <a:t>Acessar o site do governo para realizar o download referente ao ano que será trabalhado.</a:t>
+            </a:r>
+          </a:p>
+          <a:p>
+            <a:pPr lvl="0" algn="just"/>
+            <a:r>
+              <a:rPr lang="pt-BR" dirty="0"/>
+              <a:t>Realizar o </a:t>
+            </a:r>
+            <a:r>
+              <a:rPr lang="pt-BR" dirty="0" err="1"/>
+              <a:t>load</a:t>
+            </a:r>
+            <a:r>
+              <a:rPr lang="pt-BR" dirty="0"/>
+              <a:t> do arquivo ou realizar o download no servidor.</a:t>
+            </a:r>
+          </a:p>
+          <a:p>
+            <a:pPr lvl="0" algn="just"/>
+            <a:r>
+              <a:rPr lang="pt-BR" dirty="0"/>
+              <a:t>Descompactar o arquivo dos dados brutos.</a:t>
+            </a:r>
+          </a:p>
+          <a:p>
+            <a:pPr lvl="0" algn="just"/>
+            <a:r>
+              <a:rPr lang="pt-BR" dirty="0"/>
+              <a:t>Executar os scripts Shell e Python que tem por objetivo extrair os dados, transformá-los e, por fim, realizar o Load para a tabela destino.</a:t>
+            </a:r>
+          </a:p>
+          <a:p>
+            <a:endParaRPr lang="pt-BR" dirty="0"/>
+          </a:p>
+        </p:txBody>
+      </p:sp>
+    </p:spTree>
+    <p:extLst>
+      <p:ext uri="{BB962C8B-B14F-4D97-AF65-F5344CB8AC3E}">
+        <p14:creationId xmlns:p14="http://schemas.microsoft.com/office/powerpoint/2010/main" val="1170380226"/>
+      </p:ext>
+    </p:extLst>
+  </p:cSld>
+  <p:clrMapOvr>
+    <a:masterClrMapping/>
+  </p:clrMapOvr>
+</p:sld>
+</file>
+
 <file path=ppt/slides/slide9.xml><?xml version="1.0" encoding="utf-8"?>
 <p:sld xmlns:a="http://schemas.openxmlformats.org/drawingml/2006/main" xmlns:r="http://schemas.openxmlformats.org/officeDocument/2006/relationships" xmlns:p="http://schemas.openxmlformats.org/presentationml/2006/main">
   <p:cSld>
@@ -5375,7 +5929,7 @@
           <p:cNvPr id="2" name="Título 1">
             <a:extLst>
               <a:ext uri="{FF2B5EF4-FFF2-40B4-BE49-F238E27FC236}">
-                <a16:creationId xmlns:a16="http://schemas.microsoft.com/office/drawing/2014/main" id="{46A95C4D-FEDB-4D6F-9A85-8D656F0138B4}"/>
+                <a16:creationId xmlns:a16="http://schemas.microsoft.com/office/drawing/2014/main" id="{F4CB12D3-4265-43E4-87F2-7433FCCB1AAB}"/>
               </a:ext>
             </a:extLst>
           </p:cNvPr>
@@ -5386,68 +5940,91 @@
             <p:ph type="title"/>
           </p:nvPr>
         </p:nvSpPr>
-        <p:spPr/>
+        <p:spPr>
+          <a:xfrm>
+            <a:off x="2389757" y="302956"/>
+            <a:ext cx="7729728" cy="1188720"/>
+          </a:xfrm>
+        </p:spPr>
         <p:txBody>
           <a:bodyPr/>
           <a:lstStyle/>
           <a:p>
             <a:r>
               <a:rPr lang="pt-BR" dirty="0"/>
-              <a:t>Limitações</a:t>
-            </a:r>
-          </a:p>
-        </p:txBody>
-      </p:sp>
-      <p:sp>
-        <p:nvSpPr>
-          <p:cNvPr id="3" name="Espaço Reservado para Conteúdo 2">
+              <a:t>ETL DOS DADOS FONTES PARA O TRANSACIONAL</a:t>
+            </a:r>
+          </a:p>
+        </p:txBody>
+      </p:sp>
+      <p:pic>
+        <p:nvPicPr>
+          <p:cNvPr id="6" name="Espaço Reservado para Conteúdo 5" descr="Texto&#10;&#10;Descrição gerada automaticamente">
             <a:extLst>
               <a:ext uri="{FF2B5EF4-FFF2-40B4-BE49-F238E27FC236}">
-                <a16:creationId xmlns:a16="http://schemas.microsoft.com/office/drawing/2014/main" id="{73190E5A-FB2B-41E3-8959-40D8E8B89DC5}"/>
+                <a16:creationId xmlns:a16="http://schemas.microsoft.com/office/drawing/2014/main" id="{1AA75A75-0FF5-4498-BF2F-745372B0C79E}"/>
               </a:ext>
             </a:extLst>
           </p:cNvPr>
-          <p:cNvSpPr>
-            <a:spLocks noGrp="1"/>
-          </p:cNvSpPr>
-          <p:nvPr>
-            <p:ph idx="1"/>
-          </p:nvPr>
-        </p:nvSpPr>
-        <p:spPr/>
-        <p:txBody>
-          <a:bodyPr/>
-          <a:lstStyle/>
-          <a:p>
-            <a:r>
-              <a:rPr lang="pt-BR" dirty="0"/>
-              <a:t>Padronização dos dados.</a:t>
-            </a:r>
-          </a:p>
-          <a:p>
-            <a:r>
-              <a:rPr lang="pt-BR" dirty="0"/>
-              <a:t>Criação da infraestrutura.</a:t>
-            </a:r>
-          </a:p>
-          <a:p>
-            <a:r>
-              <a:rPr lang="pt-BR" dirty="0"/>
-              <a:t>Armazenamento dos dados.</a:t>
-            </a:r>
-          </a:p>
-          <a:p>
-            <a:r>
-              <a:rPr lang="pt-BR" dirty="0"/>
-              <a:t>Capacidade de processamento dos dados.</a:t>
-            </a:r>
-          </a:p>
-        </p:txBody>
-      </p:sp>
+          <p:cNvPicPr>
+            <a:picLocks noGrp="1" noChangeAspect="1"/>
+          </p:cNvPicPr>
+          <p:nvPr>
+            <p:ph sz="half" idx="2"/>
+          </p:nvPr>
+        </p:nvPicPr>
+        <p:blipFill>
+          <a:blip r:embed="rId2"/>
+          <a:stretch>
+            <a:fillRect/>
+          </a:stretch>
+        </p:blipFill>
+        <p:spPr>
+          <a:xfrm>
+            <a:off x="6438122" y="1782148"/>
+            <a:ext cx="5501949" cy="4814530"/>
+          </a:xfrm>
+          <a:prstGeom prst="rect">
+            <a:avLst/>
+          </a:prstGeom>
+        </p:spPr>
+      </p:pic>
+      <p:pic>
+        <p:nvPicPr>
+          <p:cNvPr id="7" name="Espaço Reservado para Conteúdo 6" descr="Interface gráfica do usuário, Texto, Aplicativo, Email&#10;&#10;Descrição gerada automaticamente">
+            <a:extLst>
+              <a:ext uri="{FF2B5EF4-FFF2-40B4-BE49-F238E27FC236}">
+                <a16:creationId xmlns:a16="http://schemas.microsoft.com/office/drawing/2014/main" id="{0274520D-DD3E-4FC3-9567-10418379D8CA}"/>
+              </a:ext>
+            </a:extLst>
+          </p:cNvPr>
+          <p:cNvPicPr>
+            <a:picLocks noGrp="1" noChangeAspect="1"/>
+          </p:cNvPicPr>
+          <p:nvPr>
+            <p:ph sz="half" idx="1"/>
+          </p:nvPr>
+        </p:nvPicPr>
+        <p:blipFill>
+          <a:blip r:embed="rId3"/>
+          <a:stretch>
+            <a:fillRect/>
+          </a:stretch>
+        </p:blipFill>
+        <p:spPr>
+          <a:xfrm>
+            <a:off x="251928" y="1782148"/>
+            <a:ext cx="6008913" cy="4814530"/>
+          </a:xfrm>
+          <a:prstGeom prst="rect">
+            <a:avLst/>
+          </a:prstGeom>
+        </p:spPr>
+      </p:pic>
     </p:spTree>
     <p:extLst>
       <p:ext uri="{BB962C8B-B14F-4D97-AF65-F5344CB8AC3E}">
-        <p14:creationId xmlns:p14="http://schemas.microsoft.com/office/powerpoint/2010/main" val="493301709"/>
+        <p14:creationId xmlns:p14="http://schemas.microsoft.com/office/powerpoint/2010/main" val="788224151"/>
       </p:ext>
     </p:extLst>
   </p:cSld>
@@ -6010,4 +6587,47 @@
     </a:ext>
   </a:extLst>
 </a:theme>
+</file>
+
+<file path=ppt/theme/themeOverride1.xml><?xml version="1.0" encoding="utf-8"?>
+<a:themeOverride xmlns:a="http://schemas.openxmlformats.org/drawingml/2006/main">
+  <a:clrScheme name="Pacote">
+    <a:dk1>
+      <a:srgbClr val="000000"/>
+    </a:dk1>
+    <a:lt1>
+      <a:srgbClr val="FFFFFF"/>
+    </a:lt1>
+    <a:dk2>
+      <a:srgbClr val="4A5356"/>
+    </a:dk2>
+    <a:lt2>
+      <a:srgbClr val="E8E3CE"/>
+    </a:lt2>
+    <a:accent1>
+      <a:srgbClr val="F6A21D"/>
+    </a:accent1>
+    <a:accent2>
+      <a:srgbClr val="9BAFB5"/>
+    </a:accent2>
+    <a:accent3>
+      <a:srgbClr val="C96731"/>
+    </a:accent3>
+    <a:accent4>
+      <a:srgbClr val="9CA383"/>
+    </a:accent4>
+    <a:accent5>
+      <a:srgbClr val="87795D"/>
+    </a:accent5>
+    <a:accent6>
+      <a:srgbClr val="A0988C"/>
+    </a:accent6>
+    <a:hlink>
+      <a:srgbClr val="00B0F0"/>
+    </a:hlink>
+    <a:folHlink>
+      <a:srgbClr val="738F97"/>
+    </a:folHlink>
+  </a:clrScheme>
+</a:themeOverride>
 </file>
</xml_diff>